<commit_message>
major commit after end of data collection from Coldplay
</commit_message>
<xml_diff>
--- a/הוראות ניסוי יעל - מתוקן.pptx
+++ b/הוראות ניסוי יעל - מתוקן.pptx
@@ -37,13 +37,13 @@
     <p:sldId id="277" r:id="rId31"/>
     <p:sldId id="278" r:id="rId32"/>
     <p:sldId id="279" r:id="rId33"/>
-    <p:sldId id="280" r:id="rId34"/>
-    <p:sldId id="281" r:id="rId35"/>
-    <p:sldId id="282" r:id="rId36"/>
-    <p:sldId id="283" r:id="rId37"/>
-    <p:sldId id="284" r:id="rId38"/>
-    <p:sldId id="285" r:id="rId39"/>
-    <p:sldId id="286" r:id="rId40"/>
+    <p:sldId id="304" r:id="rId34"/>
+    <p:sldId id="305" r:id="rId35"/>
+    <p:sldId id="306" r:id="rId36"/>
+    <p:sldId id="307" r:id="rId37"/>
+    <p:sldId id="308" r:id="rId38"/>
+    <p:sldId id="309" r:id="rId39"/>
+    <p:sldId id="310" r:id="rId40"/>
     <p:sldId id="287" r:id="rId41"/>
   </p:sldIdLst>
   <p:sldSz cx="12192000" cy="6858000"/>
@@ -300,7 +300,7 @@
           <a:p>
             <a:fld id="{EC21AB12-478C-4485-A698-50060911AEFB}" type="datetimeFigureOut">
               <a:rPr lang="he-IL" smtClean="0"/>
-              <a:t>כ"א/אב/תשפ"ב</a:t>
+              <a:t>י"א/כסלו/תשפ"ג</a:t>
             </a:fld>
             <a:endParaRPr lang="he-IL"/>
           </a:p>
@@ -500,7 +500,7 @@
           <a:p>
             <a:fld id="{EC21AB12-478C-4485-A698-50060911AEFB}" type="datetimeFigureOut">
               <a:rPr lang="he-IL" smtClean="0"/>
-              <a:t>כ"א/אב/תשפ"ב</a:t>
+              <a:t>י"א/כסלו/תשפ"ג</a:t>
             </a:fld>
             <a:endParaRPr lang="he-IL"/>
           </a:p>
@@ -710,7 +710,7 @@
           <a:p>
             <a:fld id="{EC21AB12-478C-4485-A698-50060911AEFB}" type="datetimeFigureOut">
               <a:rPr lang="he-IL" smtClean="0"/>
-              <a:t>כ"א/אב/תשפ"ב</a:t>
+              <a:t>י"א/כסלו/תשפ"ג</a:t>
             </a:fld>
             <a:endParaRPr lang="he-IL"/>
           </a:p>
@@ -910,7 +910,7 @@
           <a:p>
             <a:fld id="{EC21AB12-478C-4485-A698-50060911AEFB}" type="datetimeFigureOut">
               <a:rPr lang="he-IL" smtClean="0"/>
-              <a:t>כ"א/אב/תשפ"ב</a:t>
+              <a:t>י"א/כסלו/תשפ"ג</a:t>
             </a:fld>
             <a:endParaRPr lang="he-IL"/>
           </a:p>
@@ -1186,7 +1186,7 @@
           <a:p>
             <a:fld id="{EC21AB12-478C-4485-A698-50060911AEFB}" type="datetimeFigureOut">
               <a:rPr lang="he-IL" smtClean="0"/>
-              <a:t>כ"א/אב/תשפ"ב</a:t>
+              <a:t>י"א/כסלו/תשפ"ג</a:t>
             </a:fld>
             <a:endParaRPr lang="he-IL"/>
           </a:p>
@@ -1454,7 +1454,7 @@
           <a:p>
             <a:fld id="{EC21AB12-478C-4485-A698-50060911AEFB}" type="datetimeFigureOut">
               <a:rPr lang="he-IL" smtClean="0"/>
-              <a:t>כ"א/אב/תשפ"ב</a:t>
+              <a:t>י"א/כסלו/תשפ"ג</a:t>
             </a:fld>
             <a:endParaRPr lang="he-IL"/>
           </a:p>
@@ -1869,7 +1869,7 @@
           <a:p>
             <a:fld id="{EC21AB12-478C-4485-A698-50060911AEFB}" type="datetimeFigureOut">
               <a:rPr lang="he-IL" smtClean="0"/>
-              <a:t>כ"א/אב/תשפ"ב</a:t>
+              <a:t>י"א/כסלו/תשפ"ג</a:t>
             </a:fld>
             <a:endParaRPr lang="he-IL"/>
           </a:p>
@@ -2011,7 +2011,7 @@
           <a:p>
             <a:fld id="{EC21AB12-478C-4485-A698-50060911AEFB}" type="datetimeFigureOut">
               <a:rPr lang="he-IL" smtClean="0"/>
-              <a:t>כ"א/אב/תשפ"ב</a:t>
+              <a:t>י"א/כסלו/תשפ"ג</a:t>
             </a:fld>
             <a:endParaRPr lang="he-IL"/>
           </a:p>
@@ -2124,7 +2124,7 @@
           <a:p>
             <a:fld id="{EC21AB12-478C-4485-A698-50060911AEFB}" type="datetimeFigureOut">
               <a:rPr lang="he-IL" smtClean="0"/>
-              <a:t>כ"א/אב/תשפ"ב</a:t>
+              <a:t>י"א/כסלו/תשפ"ג</a:t>
             </a:fld>
             <a:endParaRPr lang="he-IL"/>
           </a:p>
@@ -2437,7 +2437,7 @@
           <a:p>
             <a:fld id="{EC21AB12-478C-4485-A698-50060911AEFB}" type="datetimeFigureOut">
               <a:rPr lang="he-IL" smtClean="0"/>
-              <a:t>כ"א/אב/תשפ"ב</a:t>
+              <a:t>י"א/כסלו/תשפ"ג</a:t>
             </a:fld>
             <a:endParaRPr lang="he-IL"/>
           </a:p>
@@ -2726,7 +2726,7 @@
           <a:p>
             <a:fld id="{EC21AB12-478C-4485-A698-50060911AEFB}" type="datetimeFigureOut">
               <a:rPr lang="he-IL" smtClean="0"/>
-              <a:t>כ"א/אב/תשפ"ב</a:t>
+              <a:t>י"א/כסלו/תשפ"ג</a:t>
             </a:fld>
             <a:endParaRPr lang="he-IL"/>
           </a:p>
@@ -2969,7 +2969,7 @@
           <a:p>
             <a:fld id="{EC21AB12-478C-4485-A698-50060911AEFB}" type="datetimeFigureOut">
               <a:rPr lang="he-IL" smtClean="0"/>
-              <a:t>כ"א/אב/תשפ"ב</a:t>
+              <a:t>י"א/כסלו/תשפ"ג</a:t>
             </a:fld>
             <a:endParaRPr lang="he-IL"/>
           </a:p>
@@ -3529,8 +3529,21 @@
             </a:pPr>
             <a:r>
               <a:rPr lang="he-IL" sz="1800" dirty="0"/>
-              <a:t>הזכייה במטבע תלויה בפרחים שתבחר, חלק מהפרחים טובים יותר מאחרים.</a:t>
-            </a:r>
+              <a:t>הזכייה במטבע תלויה בפרחים שתבחר, </a:t>
+            </a:r>
+            <a:r>
+              <a:rPr lang="he-IL" sz="1800" dirty="0" smtClean="0"/>
+              <a:t>לחלק </a:t>
+            </a:r>
+            <a:r>
+              <a:rPr lang="he-IL" sz="1800" dirty="0"/>
+              <a:t>מהפרחים </a:t>
+            </a:r>
+            <a:r>
+              <a:rPr lang="he-IL" sz="1800" dirty="0" smtClean="0"/>
+              <a:t>יש סיכוי גבוה יותר לצמוח ולחלק פחות.</a:t>
+            </a:r>
+            <a:endParaRPr lang="he-IL" sz="1800" dirty="0"/>
           </a:p>
           <a:p>
             <a:pPr marL="0" indent="0" algn="ctr">
@@ -7586,8 +7599,51 @@
                 <a:latin typeface="Segoe UI" panose="020B0502040204020203" pitchFamily="34" charset="0"/>
                 <a:cs typeface="Segoe UI" panose="020B0502040204020203" pitchFamily="34" charset="0"/>
               </a:rPr>
-              <a:t>אתה יכול התמתח קצת ולקחת הפסקה קצרה בזמן שאתה יושב בכיסא.</a:t>
-            </a:r>
+              <a:t>אתה יכול </a:t>
+            </a:r>
+            <a:r>
+              <a:rPr lang="he-IL" sz="1800" dirty="0" smtClean="0">
+                <a:latin typeface="Segoe UI" panose="020B0502040204020203" pitchFamily="34" charset="0"/>
+                <a:cs typeface="Segoe UI" panose="020B0502040204020203" pitchFamily="34" charset="0"/>
+              </a:rPr>
+              <a:t>להתמתח </a:t>
+            </a:r>
+            <a:r>
+              <a:rPr lang="he-IL" sz="1800" dirty="0">
+                <a:latin typeface="Segoe UI" panose="020B0502040204020203" pitchFamily="34" charset="0"/>
+                <a:cs typeface="Segoe UI" panose="020B0502040204020203" pitchFamily="34" charset="0"/>
+              </a:rPr>
+              <a:t>קצת ולקחת הפסקה קצרה בזמן שאתה יושב בכיסא</a:t>
+            </a:r>
+            <a:r>
+              <a:rPr lang="he-IL" sz="1800" dirty="0" smtClean="0">
+                <a:latin typeface="Segoe UI" panose="020B0502040204020203" pitchFamily="34" charset="0"/>
+                <a:cs typeface="Segoe UI" panose="020B0502040204020203" pitchFamily="34" charset="0"/>
+              </a:rPr>
+              <a:t>.</a:t>
+            </a:r>
+            <a:endParaRPr lang="en-US" sz="1800" dirty="0" smtClean="0">
+              <a:latin typeface="Segoe UI" panose="020B0502040204020203" pitchFamily="34" charset="0"/>
+              <a:cs typeface="Segoe UI" panose="020B0502040204020203" pitchFamily="34" charset="0"/>
+            </a:endParaRPr>
+          </a:p>
+          <a:p>
+            <a:pPr marL="0" indent="0" algn="ctr">
+              <a:buNone/>
+            </a:pPr>
+            <a:endParaRPr lang="en-US" sz="1800" dirty="0">
+              <a:latin typeface="Segoe UI" panose="020B0502040204020203" pitchFamily="34" charset="0"/>
+              <a:cs typeface="Segoe UI" panose="020B0502040204020203" pitchFamily="34" charset="0"/>
+            </a:endParaRPr>
+          </a:p>
+          <a:p>
+            <a:pPr marL="0" indent="0" algn="ctr">
+              <a:buNone/>
+            </a:pPr>
+            <a:endParaRPr lang="he-IL" sz="1800" dirty="0">
+              <a:latin typeface="Segoe UI" panose="020B0502040204020203" pitchFamily="34" charset="0"/>
+              <a:cs typeface="Segoe UI" panose="020B0502040204020203" pitchFamily="34" charset="0"/>
+            </a:endParaRPr>
           </a:p>
         </p:txBody>
       </p:sp>
@@ -7629,6 +7685,104 @@
               <a:rPr lang="he-IL" sz="1400" dirty="0"/>
               <a:t>לחץ על הלחצן השמאלי להמשיך</a:t>
             </a:r>
+          </a:p>
+        </p:txBody>
+      </p:sp>
+      <p:sp>
+        <p:nvSpPr>
+          <p:cNvPr id="2" name="TextBox 1"/>
+          <p:cNvSpPr txBox="1"/>
+          <p:nvPr/>
+        </p:nvSpPr>
+        <p:spPr>
+          <a:xfrm>
+            <a:off x="6668236" y="3218812"/>
+            <a:ext cx="860326" cy="369332"/>
+          </a:xfrm>
+          <a:prstGeom prst="rect">
+            <a:avLst/>
+          </a:prstGeom>
+          <a:noFill/>
+        </p:spPr>
+        <p:txBody>
+          <a:bodyPr wrap="square" rtlCol="0">
+            <a:spAutoFit/>
+          </a:bodyPr>
+          <a:lstStyle/>
+          <a:p>
+            <a:r>
+              <a:rPr lang="he-IL" dirty="0" smtClean="0"/>
+              <a:t>אספת</a:t>
+            </a:r>
+            <a:endParaRPr lang="en-US" dirty="0"/>
+          </a:p>
+        </p:txBody>
+      </p:sp>
+      <p:sp>
+        <p:nvSpPr>
+          <p:cNvPr id="5" name="TextBox 4"/>
+          <p:cNvSpPr txBox="1"/>
+          <p:nvPr/>
+        </p:nvSpPr>
+        <p:spPr>
+          <a:xfrm>
+            <a:off x="4551260" y="3218812"/>
+            <a:ext cx="1087540" cy="369332"/>
+          </a:xfrm>
+          <a:prstGeom prst="rect">
+            <a:avLst/>
+          </a:prstGeom>
+          <a:noFill/>
+        </p:spPr>
+        <p:txBody>
+          <a:bodyPr wrap="square" rtlCol="0">
+            <a:spAutoFit/>
+          </a:bodyPr>
+          <a:lstStyle/>
+          <a:p>
+            <a:r>
+              <a:rPr lang="he-IL" dirty="0" smtClean="0"/>
+              <a:t>מטבעות</a:t>
+            </a:r>
+            <a:endParaRPr lang="en-US" dirty="0"/>
+          </a:p>
+        </p:txBody>
+      </p:sp>
+      <p:sp>
+        <p:nvSpPr>
+          <p:cNvPr id="6" name="TextBox 5">
+            <a:extLst>
+              <a:ext uri="{FF2B5EF4-FFF2-40B4-BE49-F238E27FC236}">
+                <a16:creationId xmlns:a16="http://schemas.microsoft.com/office/drawing/2014/main" id="{60D9569B-6FF1-E6D8-3D9C-6523D58A9BA8}"/>
+              </a:ext>
+            </a:extLst>
+          </p:cNvPr>
+          <p:cNvSpPr txBox="1"/>
+          <p:nvPr/>
+        </p:nvSpPr>
+        <p:spPr>
+          <a:xfrm>
+            <a:off x="5638800" y="3244334"/>
+            <a:ext cx="914400" cy="369332"/>
+          </a:xfrm>
+          <a:prstGeom prst="rect">
+            <a:avLst/>
+          </a:prstGeom>
+          <a:noFill/>
+          <a:ln>
+            <a:solidFill>
+              <a:schemeClr val="tx1"/>
+            </a:solidFill>
+          </a:ln>
+        </p:spPr>
+        <p:txBody>
+          <a:bodyPr wrap="square" rtlCol="1">
+            <a:spAutoFit/>
+          </a:bodyPr>
+          <a:lstStyle/>
+          <a:p>
+            <a:pPr algn="ctr"/>
+            <a:endParaRPr lang="he-IL" dirty="0"/>
           </a:p>
         </p:txBody>
       </p:sp>
@@ -7667,195 +7821,30 @@
           <p:cNvPr id="4" name="Content Placeholder 2">
             <a:extLst>
               <a:ext uri="{FF2B5EF4-FFF2-40B4-BE49-F238E27FC236}">
-                <a16:creationId xmlns:a16="http://schemas.microsoft.com/office/drawing/2014/main" id="{33E69F2B-28FC-CAFF-91C7-A11CD1877BDA}"/>
-              </a:ext>
-            </a:extLst>
-          </p:cNvPr>
-          <p:cNvSpPr txBox="1">
-            <a:spLocks/>
+                <a16:creationId xmlns:a16="http://schemas.microsoft.com/office/drawing/2014/main" id="{F338F7C3-1DA3-FC02-A5C3-CA618AC932DC}"/>
+              </a:ext>
+            </a:extLst>
+          </p:cNvPr>
+          <p:cNvSpPr>
+            <a:spLocks noGrp="1"/>
           </p:cNvSpPr>
-          <p:nvPr/>
-        </p:nvSpPr>
-        <p:spPr>
-          <a:xfrm>
-            <a:off x="990600" y="1978025"/>
+          <p:nvPr>
+            <p:ph idx="1"/>
+          </p:nvPr>
+        </p:nvSpPr>
+        <p:spPr>
+          <a:xfrm>
+            <a:off x="838200" y="1825625"/>
             <a:ext cx="10515600" cy="4351338"/>
           </a:xfrm>
-          <a:prstGeom prst="rect">
-            <a:avLst/>
-          </a:prstGeom>
-        </p:spPr>
-        <p:txBody>
-          <a:bodyPr vert="horz" lIns="91440" tIns="45720" rIns="91440" bIns="45720" rtlCol="0">
+        </p:spPr>
+        <p:txBody>
+          <a:bodyPr>
             <a:normAutofit/>
           </a:bodyPr>
-          <a:lstStyle>
-            <a:lvl1pPr marL="228600" indent="-228600" algn="l" defTabSz="914400" rtl="0" eaLnBrk="1" latinLnBrk="0" hangingPunct="1">
-              <a:lnSpc>
-                <a:spcPct val="90000"/>
-              </a:lnSpc>
-              <a:spcBef>
-                <a:spcPts val="1000"/>
-              </a:spcBef>
-              <a:buFont typeface="Arial" panose="020B0604020202020204" pitchFamily="34" charset="0"/>
-              <a:buChar char="•"/>
-              <a:defRPr sz="2800" kern="1200">
-                <a:solidFill>
-                  <a:schemeClr val="tx1"/>
-                </a:solidFill>
-                <a:latin typeface="+mn-lt"/>
-                <a:ea typeface="+mn-ea"/>
-                <a:cs typeface="+mn-cs"/>
-              </a:defRPr>
-            </a:lvl1pPr>
-            <a:lvl2pPr marL="685800" indent="-228600" algn="l" defTabSz="914400" rtl="0" eaLnBrk="1" latinLnBrk="0" hangingPunct="1">
-              <a:lnSpc>
-                <a:spcPct val="90000"/>
-              </a:lnSpc>
-              <a:spcBef>
-                <a:spcPts val="500"/>
-              </a:spcBef>
-              <a:buFont typeface="Arial" panose="020B0604020202020204" pitchFamily="34" charset="0"/>
-              <a:buChar char="•"/>
-              <a:defRPr sz="2400" kern="1200">
-                <a:solidFill>
-                  <a:schemeClr val="tx1"/>
-                </a:solidFill>
-                <a:latin typeface="+mn-lt"/>
-                <a:ea typeface="+mn-ea"/>
-                <a:cs typeface="+mn-cs"/>
-              </a:defRPr>
-            </a:lvl2pPr>
-            <a:lvl3pPr marL="1143000" indent="-228600" algn="l" defTabSz="914400" rtl="0" eaLnBrk="1" latinLnBrk="0" hangingPunct="1">
-              <a:lnSpc>
-                <a:spcPct val="90000"/>
-              </a:lnSpc>
-              <a:spcBef>
-                <a:spcPts val="500"/>
-              </a:spcBef>
-              <a:buFont typeface="Arial" panose="020B0604020202020204" pitchFamily="34" charset="0"/>
-              <a:buChar char="•"/>
-              <a:defRPr sz="2000" kern="1200">
-                <a:solidFill>
-                  <a:schemeClr val="tx1"/>
-                </a:solidFill>
-                <a:latin typeface="+mn-lt"/>
-                <a:ea typeface="+mn-ea"/>
-                <a:cs typeface="+mn-cs"/>
-              </a:defRPr>
-            </a:lvl3pPr>
-            <a:lvl4pPr marL="1600200" indent="-228600" algn="l" defTabSz="914400" rtl="0" eaLnBrk="1" latinLnBrk="0" hangingPunct="1">
-              <a:lnSpc>
-                <a:spcPct val="90000"/>
-              </a:lnSpc>
-              <a:spcBef>
-                <a:spcPts val="500"/>
-              </a:spcBef>
-              <a:buFont typeface="Arial" panose="020B0604020202020204" pitchFamily="34" charset="0"/>
-              <a:buChar char="•"/>
-              <a:defRPr sz="1800" kern="1200">
-                <a:solidFill>
-                  <a:schemeClr val="tx1"/>
-                </a:solidFill>
-                <a:latin typeface="+mn-lt"/>
-                <a:ea typeface="+mn-ea"/>
-                <a:cs typeface="+mn-cs"/>
-              </a:defRPr>
-            </a:lvl4pPr>
-            <a:lvl5pPr marL="2057400" indent="-228600" algn="l" defTabSz="914400" rtl="0" eaLnBrk="1" latinLnBrk="0" hangingPunct="1">
-              <a:lnSpc>
-                <a:spcPct val="90000"/>
-              </a:lnSpc>
-              <a:spcBef>
-                <a:spcPts val="500"/>
-              </a:spcBef>
-              <a:buFont typeface="Arial" panose="020B0604020202020204" pitchFamily="34" charset="0"/>
-              <a:buChar char="•"/>
-              <a:defRPr sz="1800" kern="1200">
-                <a:solidFill>
-                  <a:schemeClr val="tx1"/>
-                </a:solidFill>
-                <a:latin typeface="+mn-lt"/>
-                <a:ea typeface="+mn-ea"/>
-                <a:cs typeface="+mn-cs"/>
-              </a:defRPr>
-            </a:lvl5pPr>
-            <a:lvl6pPr marL="2514600" indent="-228600" algn="l" defTabSz="914400" rtl="0" eaLnBrk="1" latinLnBrk="0" hangingPunct="1">
-              <a:lnSpc>
-                <a:spcPct val="90000"/>
-              </a:lnSpc>
-              <a:spcBef>
-                <a:spcPts val="500"/>
-              </a:spcBef>
-              <a:buFont typeface="Arial" panose="020B0604020202020204" pitchFamily="34" charset="0"/>
-              <a:buChar char="•"/>
-              <a:defRPr sz="1800" kern="1200">
-                <a:solidFill>
-                  <a:schemeClr val="tx1"/>
-                </a:solidFill>
-                <a:latin typeface="+mn-lt"/>
-                <a:ea typeface="+mn-ea"/>
-                <a:cs typeface="+mn-cs"/>
-              </a:defRPr>
-            </a:lvl6pPr>
-            <a:lvl7pPr marL="2971800" indent="-228600" algn="l" defTabSz="914400" rtl="0" eaLnBrk="1" latinLnBrk="0" hangingPunct="1">
-              <a:lnSpc>
-                <a:spcPct val="90000"/>
-              </a:lnSpc>
-              <a:spcBef>
-                <a:spcPts val="500"/>
-              </a:spcBef>
-              <a:buFont typeface="Arial" panose="020B0604020202020204" pitchFamily="34" charset="0"/>
-              <a:buChar char="•"/>
-              <a:defRPr sz="1800" kern="1200">
-                <a:solidFill>
-                  <a:schemeClr val="tx1"/>
-                </a:solidFill>
-                <a:latin typeface="+mn-lt"/>
-                <a:ea typeface="+mn-ea"/>
-                <a:cs typeface="+mn-cs"/>
-              </a:defRPr>
-            </a:lvl7pPr>
-            <a:lvl8pPr marL="3429000" indent="-228600" algn="l" defTabSz="914400" rtl="0" eaLnBrk="1" latinLnBrk="0" hangingPunct="1">
-              <a:lnSpc>
-                <a:spcPct val="90000"/>
-              </a:lnSpc>
-              <a:spcBef>
-                <a:spcPts val="500"/>
-              </a:spcBef>
-              <a:buFont typeface="Arial" panose="020B0604020202020204" pitchFamily="34" charset="0"/>
-              <a:buChar char="•"/>
-              <a:defRPr sz="1800" kern="1200">
-                <a:solidFill>
-                  <a:schemeClr val="tx1"/>
-                </a:solidFill>
-                <a:latin typeface="+mn-lt"/>
-                <a:ea typeface="+mn-ea"/>
-                <a:cs typeface="+mn-cs"/>
-              </a:defRPr>
-            </a:lvl8pPr>
-            <a:lvl9pPr marL="3886200" indent="-228600" algn="l" defTabSz="914400" rtl="0" eaLnBrk="1" latinLnBrk="0" hangingPunct="1">
-              <a:lnSpc>
-                <a:spcPct val="90000"/>
-              </a:lnSpc>
-              <a:spcBef>
-                <a:spcPts val="500"/>
-              </a:spcBef>
-              <a:buFont typeface="Arial" panose="020B0604020202020204" pitchFamily="34" charset="0"/>
-              <a:buChar char="•"/>
-              <a:defRPr sz="1800" kern="1200">
-                <a:solidFill>
-                  <a:schemeClr val="tx1"/>
-                </a:solidFill>
-                <a:latin typeface="+mn-lt"/>
-                <a:ea typeface="+mn-ea"/>
-                <a:cs typeface="+mn-cs"/>
-              </a:defRPr>
-            </a:lvl9pPr>
-          </a:lstStyle>
+          <a:lstStyle/>
           <a:p>
             <a:pPr marL="0" indent="0" algn="ctr">
-              <a:buFont typeface="Arial" panose="020B0604020202020204" pitchFamily="34" charset="0"/>
               <a:buNone/>
             </a:pPr>
             <a:r>
@@ -7868,7 +7857,6 @@
           </a:p>
           <a:p>
             <a:pPr marL="0" indent="0" algn="ctr">
-              <a:buFont typeface="Arial" panose="020B0604020202020204" pitchFamily="34" charset="0"/>
               <a:buNone/>
             </a:pPr>
             <a:r>
@@ -7876,21 +7864,77 @@
                 <a:latin typeface="Segoe UI" panose="020B0502040204020203" pitchFamily="34" charset="0"/>
                 <a:cs typeface="Segoe UI" panose="020B0502040204020203" pitchFamily="34" charset="0"/>
               </a:rPr>
-              <a:t>בלוק מספר 2 מתוך 8 הסתיים.</a:t>
-            </a:r>
-          </a:p>
-          <a:p>
-            <a:pPr marL="0" indent="0" algn="ctr">
-              <a:buFont typeface="Arial" panose="020B0604020202020204" pitchFamily="34" charset="0"/>
-              <a:buNone/>
-            </a:pPr>
+              <a:t>בלוק מספר </a:t>
+            </a:r>
+            <a:r>
+              <a:rPr lang="he-IL" sz="1800" dirty="0" smtClean="0">
+                <a:latin typeface="Segoe UI" panose="020B0502040204020203" pitchFamily="34" charset="0"/>
+                <a:cs typeface="Segoe UI" panose="020B0502040204020203" pitchFamily="34" charset="0"/>
+              </a:rPr>
+              <a:t>2 </a:t>
+            </a:r>
             <a:r>
               <a:rPr lang="he-IL" sz="1800" dirty="0">
                 <a:latin typeface="Segoe UI" panose="020B0502040204020203" pitchFamily="34" charset="0"/>
                 <a:cs typeface="Segoe UI" panose="020B0502040204020203" pitchFamily="34" charset="0"/>
               </a:rPr>
-              <a:t>אתה יכול התמתח קצת ולקחת הפסקה קצרה בזמן שאתה יושב בכיסא.</a:t>
-            </a:r>
+              <a:t>מתוך 8 הסתיים.</a:t>
+            </a:r>
+          </a:p>
+          <a:p>
+            <a:pPr marL="0" indent="0" algn="ctr">
+              <a:buNone/>
+            </a:pPr>
+            <a:r>
+              <a:rPr lang="he-IL" sz="1800" dirty="0">
+                <a:latin typeface="Segoe UI" panose="020B0502040204020203" pitchFamily="34" charset="0"/>
+                <a:cs typeface="Segoe UI" panose="020B0502040204020203" pitchFamily="34" charset="0"/>
+              </a:rPr>
+              <a:t>אתה יכול </a:t>
+            </a:r>
+            <a:r>
+              <a:rPr lang="he-IL" sz="1800" dirty="0" smtClean="0">
+                <a:latin typeface="Segoe UI" panose="020B0502040204020203" pitchFamily="34" charset="0"/>
+                <a:cs typeface="Segoe UI" panose="020B0502040204020203" pitchFamily="34" charset="0"/>
+              </a:rPr>
+              <a:t>להתמתח </a:t>
+            </a:r>
+            <a:r>
+              <a:rPr lang="he-IL" sz="1800" dirty="0">
+                <a:latin typeface="Segoe UI" panose="020B0502040204020203" pitchFamily="34" charset="0"/>
+                <a:cs typeface="Segoe UI" panose="020B0502040204020203" pitchFamily="34" charset="0"/>
+              </a:rPr>
+              <a:t>קצת ולקחת הפסקה קצרה בזמן שאתה יושב בכיסא</a:t>
+            </a:r>
+            <a:r>
+              <a:rPr lang="he-IL" sz="1800" dirty="0" smtClean="0">
+                <a:latin typeface="Segoe UI" panose="020B0502040204020203" pitchFamily="34" charset="0"/>
+                <a:cs typeface="Segoe UI" panose="020B0502040204020203" pitchFamily="34" charset="0"/>
+              </a:rPr>
+              <a:t>.</a:t>
+            </a:r>
+            <a:endParaRPr lang="en-US" sz="1800" dirty="0" smtClean="0">
+              <a:latin typeface="Segoe UI" panose="020B0502040204020203" pitchFamily="34" charset="0"/>
+              <a:cs typeface="Segoe UI" panose="020B0502040204020203" pitchFamily="34" charset="0"/>
+            </a:endParaRPr>
+          </a:p>
+          <a:p>
+            <a:pPr marL="0" indent="0" algn="ctr">
+              <a:buNone/>
+            </a:pPr>
+            <a:endParaRPr lang="en-US" sz="1800" dirty="0">
+              <a:latin typeface="Segoe UI" panose="020B0502040204020203" pitchFamily="34" charset="0"/>
+              <a:cs typeface="Segoe UI" panose="020B0502040204020203" pitchFamily="34" charset="0"/>
+            </a:endParaRPr>
+          </a:p>
+          <a:p>
+            <a:pPr marL="0" indent="0" algn="ctr">
+              <a:buNone/>
+            </a:pPr>
+            <a:endParaRPr lang="he-IL" sz="1800" dirty="0">
+              <a:latin typeface="Segoe UI" panose="020B0502040204020203" pitchFamily="34" charset="0"/>
+              <a:cs typeface="Segoe UI" panose="020B0502040204020203" pitchFamily="34" charset="0"/>
+            </a:endParaRPr>
           </a:p>
         </p:txBody>
       </p:sp>
@@ -7935,10 +7979,108 @@
           </a:p>
         </p:txBody>
       </p:sp>
+      <p:sp>
+        <p:nvSpPr>
+          <p:cNvPr id="2" name="TextBox 1"/>
+          <p:cNvSpPr txBox="1"/>
+          <p:nvPr/>
+        </p:nvSpPr>
+        <p:spPr>
+          <a:xfrm>
+            <a:off x="6668236" y="3218812"/>
+            <a:ext cx="860326" cy="369332"/>
+          </a:xfrm>
+          <a:prstGeom prst="rect">
+            <a:avLst/>
+          </a:prstGeom>
+          <a:noFill/>
+        </p:spPr>
+        <p:txBody>
+          <a:bodyPr wrap="square" rtlCol="0">
+            <a:spAutoFit/>
+          </a:bodyPr>
+          <a:lstStyle/>
+          <a:p>
+            <a:r>
+              <a:rPr lang="he-IL" dirty="0" smtClean="0"/>
+              <a:t>אספת</a:t>
+            </a:r>
+            <a:endParaRPr lang="en-US" dirty="0"/>
+          </a:p>
+        </p:txBody>
+      </p:sp>
+      <p:sp>
+        <p:nvSpPr>
+          <p:cNvPr id="5" name="TextBox 4"/>
+          <p:cNvSpPr txBox="1"/>
+          <p:nvPr/>
+        </p:nvSpPr>
+        <p:spPr>
+          <a:xfrm>
+            <a:off x="4551260" y="3218812"/>
+            <a:ext cx="1087540" cy="369332"/>
+          </a:xfrm>
+          <a:prstGeom prst="rect">
+            <a:avLst/>
+          </a:prstGeom>
+          <a:noFill/>
+        </p:spPr>
+        <p:txBody>
+          <a:bodyPr wrap="square" rtlCol="0">
+            <a:spAutoFit/>
+          </a:bodyPr>
+          <a:lstStyle/>
+          <a:p>
+            <a:r>
+              <a:rPr lang="he-IL" dirty="0" smtClean="0"/>
+              <a:t>מטבעות</a:t>
+            </a:r>
+            <a:endParaRPr lang="en-US" dirty="0"/>
+          </a:p>
+        </p:txBody>
+      </p:sp>
+      <p:sp>
+        <p:nvSpPr>
+          <p:cNvPr id="6" name="TextBox 5">
+            <a:extLst>
+              <a:ext uri="{FF2B5EF4-FFF2-40B4-BE49-F238E27FC236}">
+                <a16:creationId xmlns:a16="http://schemas.microsoft.com/office/drawing/2014/main" id="{60D9569B-6FF1-E6D8-3D9C-6523D58A9BA8}"/>
+              </a:ext>
+            </a:extLst>
+          </p:cNvPr>
+          <p:cNvSpPr txBox="1"/>
+          <p:nvPr/>
+        </p:nvSpPr>
+        <p:spPr>
+          <a:xfrm>
+            <a:off x="5638800" y="3244334"/>
+            <a:ext cx="914400" cy="369332"/>
+          </a:xfrm>
+          <a:prstGeom prst="rect">
+            <a:avLst/>
+          </a:prstGeom>
+          <a:noFill/>
+          <a:ln>
+            <a:solidFill>
+              <a:schemeClr val="tx1"/>
+            </a:solidFill>
+          </a:ln>
+        </p:spPr>
+        <p:txBody>
+          <a:bodyPr wrap="square" rtlCol="1">
+            <a:spAutoFit/>
+          </a:bodyPr>
+          <a:lstStyle/>
+          <a:p>
+            <a:pPr algn="ctr"/>
+            <a:endParaRPr lang="he-IL" dirty="0"/>
+          </a:p>
+        </p:txBody>
+      </p:sp>
     </p:spTree>
     <p:extLst>
       <p:ext uri="{BB962C8B-B14F-4D97-AF65-F5344CB8AC3E}">
-        <p14:creationId xmlns:p14="http://schemas.microsoft.com/office/powerpoint/2010/main" val="2032419335"/>
+        <p14:creationId xmlns:p14="http://schemas.microsoft.com/office/powerpoint/2010/main" val="3664543751"/>
       </p:ext>
     </p:extLst>
   </p:cSld>
@@ -7970,195 +8112,30 @@
           <p:cNvPr id="4" name="Content Placeholder 2">
             <a:extLst>
               <a:ext uri="{FF2B5EF4-FFF2-40B4-BE49-F238E27FC236}">
-                <a16:creationId xmlns:a16="http://schemas.microsoft.com/office/drawing/2014/main" id="{DE80A1AC-184F-C9F0-9D75-3755D7F23ED6}"/>
-              </a:ext>
-            </a:extLst>
-          </p:cNvPr>
-          <p:cNvSpPr txBox="1">
-            <a:spLocks/>
+                <a16:creationId xmlns:a16="http://schemas.microsoft.com/office/drawing/2014/main" id="{F338F7C3-1DA3-FC02-A5C3-CA618AC932DC}"/>
+              </a:ext>
+            </a:extLst>
+          </p:cNvPr>
+          <p:cNvSpPr>
+            <a:spLocks noGrp="1"/>
           </p:cNvSpPr>
-          <p:nvPr/>
-        </p:nvSpPr>
-        <p:spPr>
-          <a:xfrm>
-            <a:off x="990600" y="1978025"/>
+          <p:nvPr>
+            <p:ph idx="1"/>
+          </p:nvPr>
+        </p:nvSpPr>
+        <p:spPr>
+          <a:xfrm>
+            <a:off x="838200" y="1825625"/>
             <a:ext cx="10515600" cy="4351338"/>
           </a:xfrm>
-          <a:prstGeom prst="rect">
-            <a:avLst/>
-          </a:prstGeom>
-        </p:spPr>
-        <p:txBody>
-          <a:bodyPr vert="horz" lIns="91440" tIns="45720" rIns="91440" bIns="45720" rtlCol="0">
+        </p:spPr>
+        <p:txBody>
+          <a:bodyPr>
             <a:normAutofit/>
           </a:bodyPr>
-          <a:lstStyle>
-            <a:lvl1pPr marL="228600" indent="-228600" algn="l" defTabSz="914400" rtl="0" eaLnBrk="1" latinLnBrk="0" hangingPunct="1">
-              <a:lnSpc>
-                <a:spcPct val="90000"/>
-              </a:lnSpc>
-              <a:spcBef>
-                <a:spcPts val="1000"/>
-              </a:spcBef>
-              <a:buFont typeface="Arial" panose="020B0604020202020204" pitchFamily="34" charset="0"/>
-              <a:buChar char="•"/>
-              <a:defRPr sz="2800" kern="1200">
-                <a:solidFill>
-                  <a:schemeClr val="tx1"/>
-                </a:solidFill>
-                <a:latin typeface="+mn-lt"/>
-                <a:ea typeface="+mn-ea"/>
-                <a:cs typeface="+mn-cs"/>
-              </a:defRPr>
-            </a:lvl1pPr>
-            <a:lvl2pPr marL="685800" indent="-228600" algn="l" defTabSz="914400" rtl="0" eaLnBrk="1" latinLnBrk="0" hangingPunct="1">
-              <a:lnSpc>
-                <a:spcPct val="90000"/>
-              </a:lnSpc>
-              <a:spcBef>
-                <a:spcPts val="500"/>
-              </a:spcBef>
-              <a:buFont typeface="Arial" panose="020B0604020202020204" pitchFamily="34" charset="0"/>
-              <a:buChar char="•"/>
-              <a:defRPr sz="2400" kern="1200">
-                <a:solidFill>
-                  <a:schemeClr val="tx1"/>
-                </a:solidFill>
-                <a:latin typeface="+mn-lt"/>
-                <a:ea typeface="+mn-ea"/>
-                <a:cs typeface="+mn-cs"/>
-              </a:defRPr>
-            </a:lvl2pPr>
-            <a:lvl3pPr marL="1143000" indent="-228600" algn="l" defTabSz="914400" rtl="0" eaLnBrk="1" latinLnBrk="0" hangingPunct="1">
-              <a:lnSpc>
-                <a:spcPct val="90000"/>
-              </a:lnSpc>
-              <a:spcBef>
-                <a:spcPts val="500"/>
-              </a:spcBef>
-              <a:buFont typeface="Arial" panose="020B0604020202020204" pitchFamily="34" charset="0"/>
-              <a:buChar char="•"/>
-              <a:defRPr sz="2000" kern="1200">
-                <a:solidFill>
-                  <a:schemeClr val="tx1"/>
-                </a:solidFill>
-                <a:latin typeface="+mn-lt"/>
-                <a:ea typeface="+mn-ea"/>
-                <a:cs typeface="+mn-cs"/>
-              </a:defRPr>
-            </a:lvl3pPr>
-            <a:lvl4pPr marL="1600200" indent="-228600" algn="l" defTabSz="914400" rtl="0" eaLnBrk="1" latinLnBrk="0" hangingPunct="1">
-              <a:lnSpc>
-                <a:spcPct val="90000"/>
-              </a:lnSpc>
-              <a:spcBef>
-                <a:spcPts val="500"/>
-              </a:spcBef>
-              <a:buFont typeface="Arial" panose="020B0604020202020204" pitchFamily="34" charset="0"/>
-              <a:buChar char="•"/>
-              <a:defRPr sz="1800" kern="1200">
-                <a:solidFill>
-                  <a:schemeClr val="tx1"/>
-                </a:solidFill>
-                <a:latin typeface="+mn-lt"/>
-                <a:ea typeface="+mn-ea"/>
-                <a:cs typeface="+mn-cs"/>
-              </a:defRPr>
-            </a:lvl4pPr>
-            <a:lvl5pPr marL="2057400" indent="-228600" algn="l" defTabSz="914400" rtl="0" eaLnBrk="1" latinLnBrk="0" hangingPunct="1">
-              <a:lnSpc>
-                <a:spcPct val="90000"/>
-              </a:lnSpc>
-              <a:spcBef>
-                <a:spcPts val="500"/>
-              </a:spcBef>
-              <a:buFont typeface="Arial" panose="020B0604020202020204" pitchFamily="34" charset="0"/>
-              <a:buChar char="•"/>
-              <a:defRPr sz="1800" kern="1200">
-                <a:solidFill>
-                  <a:schemeClr val="tx1"/>
-                </a:solidFill>
-                <a:latin typeface="+mn-lt"/>
-                <a:ea typeface="+mn-ea"/>
-                <a:cs typeface="+mn-cs"/>
-              </a:defRPr>
-            </a:lvl5pPr>
-            <a:lvl6pPr marL="2514600" indent="-228600" algn="l" defTabSz="914400" rtl="0" eaLnBrk="1" latinLnBrk="0" hangingPunct="1">
-              <a:lnSpc>
-                <a:spcPct val="90000"/>
-              </a:lnSpc>
-              <a:spcBef>
-                <a:spcPts val="500"/>
-              </a:spcBef>
-              <a:buFont typeface="Arial" panose="020B0604020202020204" pitchFamily="34" charset="0"/>
-              <a:buChar char="•"/>
-              <a:defRPr sz="1800" kern="1200">
-                <a:solidFill>
-                  <a:schemeClr val="tx1"/>
-                </a:solidFill>
-                <a:latin typeface="+mn-lt"/>
-                <a:ea typeface="+mn-ea"/>
-                <a:cs typeface="+mn-cs"/>
-              </a:defRPr>
-            </a:lvl6pPr>
-            <a:lvl7pPr marL="2971800" indent="-228600" algn="l" defTabSz="914400" rtl="0" eaLnBrk="1" latinLnBrk="0" hangingPunct="1">
-              <a:lnSpc>
-                <a:spcPct val="90000"/>
-              </a:lnSpc>
-              <a:spcBef>
-                <a:spcPts val="500"/>
-              </a:spcBef>
-              <a:buFont typeface="Arial" panose="020B0604020202020204" pitchFamily="34" charset="0"/>
-              <a:buChar char="•"/>
-              <a:defRPr sz="1800" kern="1200">
-                <a:solidFill>
-                  <a:schemeClr val="tx1"/>
-                </a:solidFill>
-                <a:latin typeface="+mn-lt"/>
-                <a:ea typeface="+mn-ea"/>
-                <a:cs typeface="+mn-cs"/>
-              </a:defRPr>
-            </a:lvl7pPr>
-            <a:lvl8pPr marL="3429000" indent="-228600" algn="l" defTabSz="914400" rtl="0" eaLnBrk="1" latinLnBrk="0" hangingPunct="1">
-              <a:lnSpc>
-                <a:spcPct val="90000"/>
-              </a:lnSpc>
-              <a:spcBef>
-                <a:spcPts val="500"/>
-              </a:spcBef>
-              <a:buFont typeface="Arial" panose="020B0604020202020204" pitchFamily="34" charset="0"/>
-              <a:buChar char="•"/>
-              <a:defRPr sz="1800" kern="1200">
-                <a:solidFill>
-                  <a:schemeClr val="tx1"/>
-                </a:solidFill>
-                <a:latin typeface="+mn-lt"/>
-                <a:ea typeface="+mn-ea"/>
-                <a:cs typeface="+mn-cs"/>
-              </a:defRPr>
-            </a:lvl8pPr>
-            <a:lvl9pPr marL="3886200" indent="-228600" algn="l" defTabSz="914400" rtl="0" eaLnBrk="1" latinLnBrk="0" hangingPunct="1">
-              <a:lnSpc>
-                <a:spcPct val="90000"/>
-              </a:lnSpc>
-              <a:spcBef>
-                <a:spcPts val="500"/>
-              </a:spcBef>
-              <a:buFont typeface="Arial" panose="020B0604020202020204" pitchFamily="34" charset="0"/>
-              <a:buChar char="•"/>
-              <a:defRPr sz="1800" kern="1200">
-                <a:solidFill>
-                  <a:schemeClr val="tx1"/>
-                </a:solidFill>
-                <a:latin typeface="+mn-lt"/>
-                <a:ea typeface="+mn-ea"/>
-                <a:cs typeface="+mn-cs"/>
-              </a:defRPr>
-            </a:lvl9pPr>
-          </a:lstStyle>
+          <a:lstStyle/>
           <a:p>
             <a:pPr marL="0" indent="0" algn="ctr">
-              <a:buFont typeface="Arial" panose="020B0604020202020204" pitchFamily="34" charset="0"/>
               <a:buNone/>
             </a:pPr>
             <a:r>
@@ -8171,7 +8148,6 @@
           </a:p>
           <a:p>
             <a:pPr marL="0" indent="0" algn="ctr">
-              <a:buFont typeface="Arial" panose="020B0604020202020204" pitchFamily="34" charset="0"/>
               <a:buNone/>
             </a:pPr>
             <a:r>
@@ -8179,21 +8155,77 @@
                 <a:latin typeface="Segoe UI" panose="020B0502040204020203" pitchFamily="34" charset="0"/>
                 <a:cs typeface="Segoe UI" panose="020B0502040204020203" pitchFamily="34" charset="0"/>
               </a:rPr>
-              <a:t>בלוק מספר 3 מתוך 8 הסתיים.</a:t>
-            </a:r>
-          </a:p>
-          <a:p>
-            <a:pPr marL="0" indent="0" algn="ctr">
-              <a:buFont typeface="Arial" panose="020B0604020202020204" pitchFamily="34" charset="0"/>
-              <a:buNone/>
-            </a:pPr>
+              <a:t>בלוק מספר </a:t>
+            </a:r>
+            <a:r>
+              <a:rPr lang="he-IL" sz="1800" dirty="0" smtClean="0">
+                <a:latin typeface="Segoe UI" panose="020B0502040204020203" pitchFamily="34" charset="0"/>
+                <a:cs typeface="Segoe UI" panose="020B0502040204020203" pitchFamily="34" charset="0"/>
+              </a:rPr>
+              <a:t>3 </a:t>
+            </a:r>
             <a:r>
               <a:rPr lang="he-IL" sz="1800" dirty="0">
                 <a:latin typeface="Segoe UI" panose="020B0502040204020203" pitchFamily="34" charset="0"/>
                 <a:cs typeface="Segoe UI" panose="020B0502040204020203" pitchFamily="34" charset="0"/>
               </a:rPr>
-              <a:t>אתה יכול התמתח קצת ולקחת הפסקה קצרה בזמן שאתה יושב בכיסא.</a:t>
-            </a:r>
+              <a:t>מתוך 8 הסתיים.</a:t>
+            </a:r>
+          </a:p>
+          <a:p>
+            <a:pPr marL="0" indent="0" algn="ctr">
+              <a:buNone/>
+            </a:pPr>
+            <a:r>
+              <a:rPr lang="he-IL" sz="1800" dirty="0">
+                <a:latin typeface="Segoe UI" panose="020B0502040204020203" pitchFamily="34" charset="0"/>
+                <a:cs typeface="Segoe UI" panose="020B0502040204020203" pitchFamily="34" charset="0"/>
+              </a:rPr>
+              <a:t>אתה יכול </a:t>
+            </a:r>
+            <a:r>
+              <a:rPr lang="he-IL" sz="1800" dirty="0" smtClean="0">
+                <a:latin typeface="Segoe UI" panose="020B0502040204020203" pitchFamily="34" charset="0"/>
+                <a:cs typeface="Segoe UI" panose="020B0502040204020203" pitchFamily="34" charset="0"/>
+              </a:rPr>
+              <a:t>להתמתח </a:t>
+            </a:r>
+            <a:r>
+              <a:rPr lang="he-IL" sz="1800" dirty="0">
+                <a:latin typeface="Segoe UI" panose="020B0502040204020203" pitchFamily="34" charset="0"/>
+                <a:cs typeface="Segoe UI" panose="020B0502040204020203" pitchFamily="34" charset="0"/>
+              </a:rPr>
+              <a:t>קצת ולקחת הפסקה קצרה בזמן שאתה יושב בכיסא</a:t>
+            </a:r>
+            <a:r>
+              <a:rPr lang="he-IL" sz="1800" dirty="0" smtClean="0">
+                <a:latin typeface="Segoe UI" panose="020B0502040204020203" pitchFamily="34" charset="0"/>
+                <a:cs typeface="Segoe UI" panose="020B0502040204020203" pitchFamily="34" charset="0"/>
+              </a:rPr>
+              <a:t>.</a:t>
+            </a:r>
+            <a:endParaRPr lang="en-US" sz="1800" dirty="0" smtClean="0">
+              <a:latin typeface="Segoe UI" panose="020B0502040204020203" pitchFamily="34" charset="0"/>
+              <a:cs typeface="Segoe UI" panose="020B0502040204020203" pitchFamily="34" charset="0"/>
+            </a:endParaRPr>
+          </a:p>
+          <a:p>
+            <a:pPr marL="0" indent="0" algn="ctr">
+              <a:buNone/>
+            </a:pPr>
+            <a:endParaRPr lang="en-US" sz="1800" dirty="0">
+              <a:latin typeface="Segoe UI" panose="020B0502040204020203" pitchFamily="34" charset="0"/>
+              <a:cs typeface="Segoe UI" panose="020B0502040204020203" pitchFamily="34" charset="0"/>
+            </a:endParaRPr>
+          </a:p>
+          <a:p>
+            <a:pPr marL="0" indent="0" algn="ctr">
+              <a:buNone/>
+            </a:pPr>
+            <a:endParaRPr lang="he-IL" sz="1800" dirty="0">
+              <a:latin typeface="Segoe UI" panose="020B0502040204020203" pitchFamily="34" charset="0"/>
+              <a:cs typeface="Segoe UI" panose="020B0502040204020203" pitchFamily="34" charset="0"/>
+            </a:endParaRPr>
           </a:p>
         </p:txBody>
       </p:sp>
@@ -8238,10 +8270,108 @@
           </a:p>
         </p:txBody>
       </p:sp>
+      <p:sp>
+        <p:nvSpPr>
+          <p:cNvPr id="2" name="TextBox 1"/>
+          <p:cNvSpPr txBox="1"/>
+          <p:nvPr/>
+        </p:nvSpPr>
+        <p:spPr>
+          <a:xfrm>
+            <a:off x="6668236" y="3218812"/>
+            <a:ext cx="860326" cy="369332"/>
+          </a:xfrm>
+          <a:prstGeom prst="rect">
+            <a:avLst/>
+          </a:prstGeom>
+          <a:noFill/>
+        </p:spPr>
+        <p:txBody>
+          <a:bodyPr wrap="square" rtlCol="0">
+            <a:spAutoFit/>
+          </a:bodyPr>
+          <a:lstStyle/>
+          <a:p>
+            <a:r>
+              <a:rPr lang="he-IL" dirty="0" smtClean="0"/>
+              <a:t>אספת</a:t>
+            </a:r>
+            <a:endParaRPr lang="en-US" dirty="0"/>
+          </a:p>
+        </p:txBody>
+      </p:sp>
+      <p:sp>
+        <p:nvSpPr>
+          <p:cNvPr id="5" name="TextBox 4"/>
+          <p:cNvSpPr txBox="1"/>
+          <p:nvPr/>
+        </p:nvSpPr>
+        <p:spPr>
+          <a:xfrm>
+            <a:off x="4551260" y="3218812"/>
+            <a:ext cx="1087540" cy="369332"/>
+          </a:xfrm>
+          <a:prstGeom prst="rect">
+            <a:avLst/>
+          </a:prstGeom>
+          <a:noFill/>
+        </p:spPr>
+        <p:txBody>
+          <a:bodyPr wrap="square" rtlCol="0">
+            <a:spAutoFit/>
+          </a:bodyPr>
+          <a:lstStyle/>
+          <a:p>
+            <a:r>
+              <a:rPr lang="he-IL" dirty="0" smtClean="0"/>
+              <a:t>מטבעות</a:t>
+            </a:r>
+            <a:endParaRPr lang="en-US" dirty="0"/>
+          </a:p>
+        </p:txBody>
+      </p:sp>
+      <p:sp>
+        <p:nvSpPr>
+          <p:cNvPr id="6" name="TextBox 5">
+            <a:extLst>
+              <a:ext uri="{FF2B5EF4-FFF2-40B4-BE49-F238E27FC236}">
+                <a16:creationId xmlns:a16="http://schemas.microsoft.com/office/drawing/2014/main" id="{60D9569B-6FF1-E6D8-3D9C-6523D58A9BA8}"/>
+              </a:ext>
+            </a:extLst>
+          </p:cNvPr>
+          <p:cNvSpPr txBox="1"/>
+          <p:nvPr/>
+        </p:nvSpPr>
+        <p:spPr>
+          <a:xfrm>
+            <a:off x="5638800" y="3244334"/>
+            <a:ext cx="914400" cy="369332"/>
+          </a:xfrm>
+          <a:prstGeom prst="rect">
+            <a:avLst/>
+          </a:prstGeom>
+          <a:noFill/>
+          <a:ln>
+            <a:solidFill>
+              <a:schemeClr val="tx1"/>
+            </a:solidFill>
+          </a:ln>
+        </p:spPr>
+        <p:txBody>
+          <a:bodyPr wrap="square" rtlCol="1">
+            <a:spAutoFit/>
+          </a:bodyPr>
+          <a:lstStyle/>
+          <a:p>
+            <a:pPr algn="ctr"/>
+            <a:endParaRPr lang="he-IL" dirty="0"/>
+          </a:p>
+        </p:txBody>
+      </p:sp>
     </p:spTree>
     <p:extLst>
       <p:ext uri="{BB962C8B-B14F-4D97-AF65-F5344CB8AC3E}">
-        <p14:creationId xmlns:p14="http://schemas.microsoft.com/office/powerpoint/2010/main" val="2436290424"/>
+        <p14:creationId xmlns:p14="http://schemas.microsoft.com/office/powerpoint/2010/main" val="1280364329"/>
       </p:ext>
     </p:extLst>
   </p:cSld>
@@ -8273,195 +8403,30 @@
           <p:cNvPr id="4" name="Content Placeholder 2">
             <a:extLst>
               <a:ext uri="{FF2B5EF4-FFF2-40B4-BE49-F238E27FC236}">
-                <a16:creationId xmlns:a16="http://schemas.microsoft.com/office/drawing/2014/main" id="{25BCBDA3-0E8C-C2E1-4A4E-0732B852D034}"/>
-              </a:ext>
-            </a:extLst>
-          </p:cNvPr>
-          <p:cNvSpPr txBox="1">
-            <a:spLocks/>
+                <a16:creationId xmlns:a16="http://schemas.microsoft.com/office/drawing/2014/main" id="{F338F7C3-1DA3-FC02-A5C3-CA618AC932DC}"/>
+              </a:ext>
+            </a:extLst>
+          </p:cNvPr>
+          <p:cNvSpPr>
+            <a:spLocks noGrp="1"/>
           </p:cNvSpPr>
-          <p:nvPr/>
-        </p:nvSpPr>
-        <p:spPr>
-          <a:xfrm>
-            <a:off x="990600" y="1978025"/>
+          <p:nvPr>
+            <p:ph idx="1"/>
+          </p:nvPr>
+        </p:nvSpPr>
+        <p:spPr>
+          <a:xfrm>
+            <a:off x="838200" y="1825625"/>
             <a:ext cx="10515600" cy="4351338"/>
           </a:xfrm>
-          <a:prstGeom prst="rect">
-            <a:avLst/>
-          </a:prstGeom>
-        </p:spPr>
-        <p:txBody>
-          <a:bodyPr vert="horz" lIns="91440" tIns="45720" rIns="91440" bIns="45720" rtlCol="0">
+        </p:spPr>
+        <p:txBody>
+          <a:bodyPr>
             <a:normAutofit/>
           </a:bodyPr>
-          <a:lstStyle>
-            <a:lvl1pPr marL="228600" indent="-228600" algn="l" defTabSz="914400" rtl="0" eaLnBrk="1" latinLnBrk="0" hangingPunct="1">
-              <a:lnSpc>
-                <a:spcPct val="90000"/>
-              </a:lnSpc>
-              <a:spcBef>
-                <a:spcPts val="1000"/>
-              </a:spcBef>
-              <a:buFont typeface="Arial" panose="020B0604020202020204" pitchFamily="34" charset="0"/>
-              <a:buChar char="•"/>
-              <a:defRPr sz="2800" kern="1200">
-                <a:solidFill>
-                  <a:schemeClr val="tx1"/>
-                </a:solidFill>
-                <a:latin typeface="+mn-lt"/>
-                <a:ea typeface="+mn-ea"/>
-                <a:cs typeface="+mn-cs"/>
-              </a:defRPr>
-            </a:lvl1pPr>
-            <a:lvl2pPr marL="685800" indent="-228600" algn="l" defTabSz="914400" rtl="0" eaLnBrk="1" latinLnBrk="0" hangingPunct="1">
-              <a:lnSpc>
-                <a:spcPct val="90000"/>
-              </a:lnSpc>
-              <a:spcBef>
-                <a:spcPts val="500"/>
-              </a:spcBef>
-              <a:buFont typeface="Arial" panose="020B0604020202020204" pitchFamily="34" charset="0"/>
-              <a:buChar char="•"/>
-              <a:defRPr sz="2400" kern="1200">
-                <a:solidFill>
-                  <a:schemeClr val="tx1"/>
-                </a:solidFill>
-                <a:latin typeface="+mn-lt"/>
-                <a:ea typeface="+mn-ea"/>
-                <a:cs typeface="+mn-cs"/>
-              </a:defRPr>
-            </a:lvl2pPr>
-            <a:lvl3pPr marL="1143000" indent="-228600" algn="l" defTabSz="914400" rtl="0" eaLnBrk="1" latinLnBrk="0" hangingPunct="1">
-              <a:lnSpc>
-                <a:spcPct val="90000"/>
-              </a:lnSpc>
-              <a:spcBef>
-                <a:spcPts val="500"/>
-              </a:spcBef>
-              <a:buFont typeface="Arial" panose="020B0604020202020204" pitchFamily="34" charset="0"/>
-              <a:buChar char="•"/>
-              <a:defRPr sz="2000" kern="1200">
-                <a:solidFill>
-                  <a:schemeClr val="tx1"/>
-                </a:solidFill>
-                <a:latin typeface="+mn-lt"/>
-                <a:ea typeface="+mn-ea"/>
-                <a:cs typeface="+mn-cs"/>
-              </a:defRPr>
-            </a:lvl3pPr>
-            <a:lvl4pPr marL="1600200" indent="-228600" algn="l" defTabSz="914400" rtl="0" eaLnBrk="1" latinLnBrk="0" hangingPunct="1">
-              <a:lnSpc>
-                <a:spcPct val="90000"/>
-              </a:lnSpc>
-              <a:spcBef>
-                <a:spcPts val="500"/>
-              </a:spcBef>
-              <a:buFont typeface="Arial" panose="020B0604020202020204" pitchFamily="34" charset="0"/>
-              <a:buChar char="•"/>
-              <a:defRPr sz="1800" kern="1200">
-                <a:solidFill>
-                  <a:schemeClr val="tx1"/>
-                </a:solidFill>
-                <a:latin typeface="+mn-lt"/>
-                <a:ea typeface="+mn-ea"/>
-                <a:cs typeface="+mn-cs"/>
-              </a:defRPr>
-            </a:lvl4pPr>
-            <a:lvl5pPr marL="2057400" indent="-228600" algn="l" defTabSz="914400" rtl="0" eaLnBrk="1" latinLnBrk="0" hangingPunct="1">
-              <a:lnSpc>
-                <a:spcPct val="90000"/>
-              </a:lnSpc>
-              <a:spcBef>
-                <a:spcPts val="500"/>
-              </a:spcBef>
-              <a:buFont typeface="Arial" panose="020B0604020202020204" pitchFamily="34" charset="0"/>
-              <a:buChar char="•"/>
-              <a:defRPr sz="1800" kern="1200">
-                <a:solidFill>
-                  <a:schemeClr val="tx1"/>
-                </a:solidFill>
-                <a:latin typeface="+mn-lt"/>
-                <a:ea typeface="+mn-ea"/>
-                <a:cs typeface="+mn-cs"/>
-              </a:defRPr>
-            </a:lvl5pPr>
-            <a:lvl6pPr marL="2514600" indent="-228600" algn="l" defTabSz="914400" rtl="0" eaLnBrk="1" latinLnBrk="0" hangingPunct="1">
-              <a:lnSpc>
-                <a:spcPct val="90000"/>
-              </a:lnSpc>
-              <a:spcBef>
-                <a:spcPts val="500"/>
-              </a:spcBef>
-              <a:buFont typeface="Arial" panose="020B0604020202020204" pitchFamily="34" charset="0"/>
-              <a:buChar char="•"/>
-              <a:defRPr sz="1800" kern="1200">
-                <a:solidFill>
-                  <a:schemeClr val="tx1"/>
-                </a:solidFill>
-                <a:latin typeface="+mn-lt"/>
-                <a:ea typeface="+mn-ea"/>
-                <a:cs typeface="+mn-cs"/>
-              </a:defRPr>
-            </a:lvl6pPr>
-            <a:lvl7pPr marL="2971800" indent="-228600" algn="l" defTabSz="914400" rtl="0" eaLnBrk="1" latinLnBrk="0" hangingPunct="1">
-              <a:lnSpc>
-                <a:spcPct val="90000"/>
-              </a:lnSpc>
-              <a:spcBef>
-                <a:spcPts val="500"/>
-              </a:spcBef>
-              <a:buFont typeface="Arial" panose="020B0604020202020204" pitchFamily="34" charset="0"/>
-              <a:buChar char="•"/>
-              <a:defRPr sz="1800" kern="1200">
-                <a:solidFill>
-                  <a:schemeClr val="tx1"/>
-                </a:solidFill>
-                <a:latin typeface="+mn-lt"/>
-                <a:ea typeface="+mn-ea"/>
-                <a:cs typeface="+mn-cs"/>
-              </a:defRPr>
-            </a:lvl7pPr>
-            <a:lvl8pPr marL="3429000" indent="-228600" algn="l" defTabSz="914400" rtl="0" eaLnBrk="1" latinLnBrk="0" hangingPunct="1">
-              <a:lnSpc>
-                <a:spcPct val="90000"/>
-              </a:lnSpc>
-              <a:spcBef>
-                <a:spcPts val="500"/>
-              </a:spcBef>
-              <a:buFont typeface="Arial" panose="020B0604020202020204" pitchFamily="34" charset="0"/>
-              <a:buChar char="•"/>
-              <a:defRPr sz="1800" kern="1200">
-                <a:solidFill>
-                  <a:schemeClr val="tx1"/>
-                </a:solidFill>
-                <a:latin typeface="+mn-lt"/>
-                <a:ea typeface="+mn-ea"/>
-                <a:cs typeface="+mn-cs"/>
-              </a:defRPr>
-            </a:lvl8pPr>
-            <a:lvl9pPr marL="3886200" indent="-228600" algn="l" defTabSz="914400" rtl="0" eaLnBrk="1" latinLnBrk="0" hangingPunct="1">
-              <a:lnSpc>
-                <a:spcPct val="90000"/>
-              </a:lnSpc>
-              <a:spcBef>
-                <a:spcPts val="500"/>
-              </a:spcBef>
-              <a:buFont typeface="Arial" panose="020B0604020202020204" pitchFamily="34" charset="0"/>
-              <a:buChar char="•"/>
-              <a:defRPr sz="1800" kern="1200">
-                <a:solidFill>
-                  <a:schemeClr val="tx1"/>
-                </a:solidFill>
-                <a:latin typeface="+mn-lt"/>
-                <a:ea typeface="+mn-ea"/>
-                <a:cs typeface="+mn-cs"/>
-              </a:defRPr>
-            </a:lvl9pPr>
-          </a:lstStyle>
+          <a:lstStyle/>
           <a:p>
             <a:pPr marL="0" indent="0" algn="ctr">
-              <a:buFont typeface="Arial" panose="020B0604020202020204" pitchFamily="34" charset="0"/>
               <a:buNone/>
             </a:pPr>
             <a:r>
@@ -8474,7 +8439,6 @@
           </a:p>
           <a:p>
             <a:pPr marL="0" indent="0" algn="ctr">
-              <a:buFont typeface="Arial" panose="020B0604020202020204" pitchFamily="34" charset="0"/>
               <a:buNone/>
             </a:pPr>
             <a:r>
@@ -8482,21 +8446,77 @@
                 <a:latin typeface="Segoe UI" panose="020B0502040204020203" pitchFamily="34" charset="0"/>
                 <a:cs typeface="Segoe UI" panose="020B0502040204020203" pitchFamily="34" charset="0"/>
               </a:rPr>
-              <a:t>בלוק מספר 4 מתוך 8 הסתיים.</a:t>
-            </a:r>
-          </a:p>
-          <a:p>
-            <a:pPr marL="0" indent="0" algn="ctr">
-              <a:buFont typeface="Arial" panose="020B0604020202020204" pitchFamily="34" charset="0"/>
-              <a:buNone/>
-            </a:pPr>
+              <a:t>בלוק מספר </a:t>
+            </a:r>
+            <a:r>
+              <a:rPr lang="he-IL" sz="1800" dirty="0" smtClean="0">
+                <a:latin typeface="Segoe UI" panose="020B0502040204020203" pitchFamily="34" charset="0"/>
+                <a:cs typeface="Segoe UI" panose="020B0502040204020203" pitchFamily="34" charset="0"/>
+              </a:rPr>
+              <a:t>4 </a:t>
+            </a:r>
             <a:r>
               <a:rPr lang="he-IL" sz="1800" dirty="0">
                 <a:latin typeface="Segoe UI" panose="020B0502040204020203" pitchFamily="34" charset="0"/>
                 <a:cs typeface="Segoe UI" panose="020B0502040204020203" pitchFamily="34" charset="0"/>
               </a:rPr>
-              <a:t>אתה יכול התמתח קצת ולקחת הפסקה קצרה בזמן שאתה יושב בכיסא.</a:t>
-            </a:r>
+              <a:t>מתוך 8 הסתיים.</a:t>
+            </a:r>
+          </a:p>
+          <a:p>
+            <a:pPr marL="0" indent="0" algn="ctr">
+              <a:buNone/>
+            </a:pPr>
+            <a:r>
+              <a:rPr lang="he-IL" sz="1800" dirty="0">
+                <a:latin typeface="Segoe UI" panose="020B0502040204020203" pitchFamily="34" charset="0"/>
+                <a:cs typeface="Segoe UI" panose="020B0502040204020203" pitchFamily="34" charset="0"/>
+              </a:rPr>
+              <a:t>אתה יכול </a:t>
+            </a:r>
+            <a:r>
+              <a:rPr lang="he-IL" sz="1800" dirty="0" smtClean="0">
+                <a:latin typeface="Segoe UI" panose="020B0502040204020203" pitchFamily="34" charset="0"/>
+                <a:cs typeface="Segoe UI" panose="020B0502040204020203" pitchFamily="34" charset="0"/>
+              </a:rPr>
+              <a:t>להתמתח </a:t>
+            </a:r>
+            <a:r>
+              <a:rPr lang="he-IL" sz="1800" dirty="0">
+                <a:latin typeface="Segoe UI" panose="020B0502040204020203" pitchFamily="34" charset="0"/>
+                <a:cs typeface="Segoe UI" panose="020B0502040204020203" pitchFamily="34" charset="0"/>
+              </a:rPr>
+              <a:t>קצת ולקחת הפסקה קצרה בזמן שאתה יושב בכיסא</a:t>
+            </a:r>
+            <a:r>
+              <a:rPr lang="he-IL" sz="1800" dirty="0" smtClean="0">
+                <a:latin typeface="Segoe UI" panose="020B0502040204020203" pitchFamily="34" charset="0"/>
+                <a:cs typeface="Segoe UI" panose="020B0502040204020203" pitchFamily="34" charset="0"/>
+              </a:rPr>
+              <a:t>.</a:t>
+            </a:r>
+            <a:endParaRPr lang="en-US" sz="1800" dirty="0" smtClean="0">
+              <a:latin typeface="Segoe UI" panose="020B0502040204020203" pitchFamily="34" charset="0"/>
+              <a:cs typeface="Segoe UI" panose="020B0502040204020203" pitchFamily="34" charset="0"/>
+            </a:endParaRPr>
+          </a:p>
+          <a:p>
+            <a:pPr marL="0" indent="0" algn="ctr">
+              <a:buNone/>
+            </a:pPr>
+            <a:endParaRPr lang="en-US" sz="1800" dirty="0">
+              <a:latin typeface="Segoe UI" panose="020B0502040204020203" pitchFamily="34" charset="0"/>
+              <a:cs typeface="Segoe UI" panose="020B0502040204020203" pitchFamily="34" charset="0"/>
+            </a:endParaRPr>
+          </a:p>
+          <a:p>
+            <a:pPr marL="0" indent="0" algn="ctr">
+              <a:buNone/>
+            </a:pPr>
+            <a:endParaRPr lang="he-IL" sz="1800" dirty="0">
+              <a:latin typeface="Segoe UI" panose="020B0502040204020203" pitchFamily="34" charset="0"/>
+              <a:cs typeface="Segoe UI" panose="020B0502040204020203" pitchFamily="34" charset="0"/>
+            </a:endParaRPr>
           </a:p>
         </p:txBody>
       </p:sp>
@@ -8541,10 +8561,108 @@
           </a:p>
         </p:txBody>
       </p:sp>
+      <p:sp>
+        <p:nvSpPr>
+          <p:cNvPr id="2" name="TextBox 1"/>
+          <p:cNvSpPr txBox="1"/>
+          <p:nvPr/>
+        </p:nvSpPr>
+        <p:spPr>
+          <a:xfrm>
+            <a:off x="6668236" y="3218812"/>
+            <a:ext cx="860326" cy="369332"/>
+          </a:xfrm>
+          <a:prstGeom prst="rect">
+            <a:avLst/>
+          </a:prstGeom>
+          <a:noFill/>
+        </p:spPr>
+        <p:txBody>
+          <a:bodyPr wrap="square" rtlCol="0">
+            <a:spAutoFit/>
+          </a:bodyPr>
+          <a:lstStyle/>
+          <a:p>
+            <a:r>
+              <a:rPr lang="he-IL" dirty="0" smtClean="0"/>
+              <a:t>אספת</a:t>
+            </a:r>
+            <a:endParaRPr lang="en-US" dirty="0"/>
+          </a:p>
+        </p:txBody>
+      </p:sp>
+      <p:sp>
+        <p:nvSpPr>
+          <p:cNvPr id="5" name="TextBox 4"/>
+          <p:cNvSpPr txBox="1"/>
+          <p:nvPr/>
+        </p:nvSpPr>
+        <p:spPr>
+          <a:xfrm>
+            <a:off x="4551260" y="3218812"/>
+            <a:ext cx="1087540" cy="369332"/>
+          </a:xfrm>
+          <a:prstGeom prst="rect">
+            <a:avLst/>
+          </a:prstGeom>
+          <a:noFill/>
+        </p:spPr>
+        <p:txBody>
+          <a:bodyPr wrap="square" rtlCol="0">
+            <a:spAutoFit/>
+          </a:bodyPr>
+          <a:lstStyle/>
+          <a:p>
+            <a:r>
+              <a:rPr lang="he-IL" dirty="0" smtClean="0"/>
+              <a:t>מטבעות</a:t>
+            </a:r>
+            <a:endParaRPr lang="en-US" dirty="0"/>
+          </a:p>
+        </p:txBody>
+      </p:sp>
+      <p:sp>
+        <p:nvSpPr>
+          <p:cNvPr id="6" name="TextBox 5">
+            <a:extLst>
+              <a:ext uri="{FF2B5EF4-FFF2-40B4-BE49-F238E27FC236}">
+                <a16:creationId xmlns:a16="http://schemas.microsoft.com/office/drawing/2014/main" id="{60D9569B-6FF1-E6D8-3D9C-6523D58A9BA8}"/>
+              </a:ext>
+            </a:extLst>
+          </p:cNvPr>
+          <p:cNvSpPr txBox="1"/>
+          <p:nvPr/>
+        </p:nvSpPr>
+        <p:spPr>
+          <a:xfrm>
+            <a:off x="5638800" y="3244334"/>
+            <a:ext cx="914400" cy="369332"/>
+          </a:xfrm>
+          <a:prstGeom prst="rect">
+            <a:avLst/>
+          </a:prstGeom>
+          <a:noFill/>
+          <a:ln>
+            <a:solidFill>
+              <a:schemeClr val="tx1"/>
+            </a:solidFill>
+          </a:ln>
+        </p:spPr>
+        <p:txBody>
+          <a:bodyPr wrap="square" rtlCol="1">
+            <a:spAutoFit/>
+          </a:bodyPr>
+          <a:lstStyle/>
+          <a:p>
+            <a:pPr algn="ctr"/>
+            <a:endParaRPr lang="he-IL" dirty="0"/>
+          </a:p>
+        </p:txBody>
+      </p:sp>
     </p:spTree>
     <p:extLst>
       <p:ext uri="{BB962C8B-B14F-4D97-AF65-F5344CB8AC3E}">
-        <p14:creationId xmlns:p14="http://schemas.microsoft.com/office/powerpoint/2010/main" val="2813335552"/>
+        <p14:creationId xmlns:p14="http://schemas.microsoft.com/office/powerpoint/2010/main" val="3433113896"/>
       </p:ext>
     </p:extLst>
   </p:cSld>
@@ -8576,195 +8694,30 @@
           <p:cNvPr id="4" name="Content Placeholder 2">
             <a:extLst>
               <a:ext uri="{FF2B5EF4-FFF2-40B4-BE49-F238E27FC236}">
-                <a16:creationId xmlns:a16="http://schemas.microsoft.com/office/drawing/2014/main" id="{8A0A9CD5-2D0D-B96D-0AAF-1D83B56B64E5}"/>
-              </a:ext>
-            </a:extLst>
-          </p:cNvPr>
-          <p:cNvSpPr txBox="1">
-            <a:spLocks/>
+                <a16:creationId xmlns:a16="http://schemas.microsoft.com/office/drawing/2014/main" id="{F338F7C3-1DA3-FC02-A5C3-CA618AC932DC}"/>
+              </a:ext>
+            </a:extLst>
+          </p:cNvPr>
+          <p:cNvSpPr>
+            <a:spLocks noGrp="1"/>
           </p:cNvSpPr>
-          <p:nvPr/>
-        </p:nvSpPr>
-        <p:spPr>
-          <a:xfrm>
-            <a:off x="990600" y="1978025"/>
+          <p:nvPr>
+            <p:ph idx="1"/>
+          </p:nvPr>
+        </p:nvSpPr>
+        <p:spPr>
+          <a:xfrm>
+            <a:off x="838200" y="1825625"/>
             <a:ext cx="10515600" cy="4351338"/>
           </a:xfrm>
-          <a:prstGeom prst="rect">
-            <a:avLst/>
-          </a:prstGeom>
-        </p:spPr>
-        <p:txBody>
-          <a:bodyPr vert="horz" lIns="91440" tIns="45720" rIns="91440" bIns="45720" rtlCol="0">
+        </p:spPr>
+        <p:txBody>
+          <a:bodyPr>
             <a:normAutofit/>
           </a:bodyPr>
-          <a:lstStyle>
-            <a:lvl1pPr marL="228600" indent="-228600" algn="l" defTabSz="914400" rtl="0" eaLnBrk="1" latinLnBrk="0" hangingPunct="1">
-              <a:lnSpc>
-                <a:spcPct val="90000"/>
-              </a:lnSpc>
-              <a:spcBef>
-                <a:spcPts val="1000"/>
-              </a:spcBef>
-              <a:buFont typeface="Arial" panose="020B0604020202020204" pitchFamily="34" charset="0"/>
-              <a:buChar char="•"/>
-              <a:defRPr sz="2800" kern="1200">
-                <a:solidFill>
-                  <a:schemeClr val="tx1"/>
-                </a:solidFill>
-                <a:latin typeface="+mn-lt"/>
-                <a:ea typeface="+mn-ea"/>
-                <a:cs typeface="+mn-cs"/>
-              </a:defRPr>
-            </a:lvl1pPr>
-            <a:lvl2pPr marL="685800" indent="-228600" algn="l" defTabSz="914400" rtl="0" eaLnBrk="1" latinLnBrk="0" hangingPunct="1">
-              <a:lnSpc>
-                <a:spcPct val="90000"/>
-              </a:lnSpc>
-              <a:spcBef>
-                <a:spcPts val="500"/>
-              </a:spcBef>
-              <a:buFont typeface="Arial" panose="020B0604020202020204" pitchFamily="34" charset="0"/>
-              <a:buChar char="•"/>
-              <a:defRPr sz="2400" kern="1200">
-                <a:solidFill>
-                  <a:schemeClr val="tx1"/>
-                </a:solidFill>
-                <a:latin typeface="+mn-lt"/>
-                <a:ea typeface="+mn-ea"/>
-                <a:cs typeface="+mn-cs"/>
-              </a:defRPr>
-            </a:lvl2pPr>
-            <a:lvl3pPr marL="1143000" indent="-228600" algn="l" defTabSz="914400" rtl="0" eaLnBrk="1" latinLnBrk="0" hangingPunct="1">
-              <a:lnSpc>
-                <a:spcPct val="90000"/>
-              </a:lnSpc>
-              <a:spcBef>
-                <a:spcPts val="500"/>
-              </a:spcBef>
-              <a:buFont typeface="Arial" panose="020B0604020202020204" pitchFamily="34" charset="0"/>
-              <a:buChar char="•"/>
-              <a:defRPr sz="2000" kern="1200">
-                <a:solidFill>
-                  <a:schemeClr val="tx1"/>
-                </a:solidFill>
-                <a:latin typeface="+mn-lt"/>
-                <a:ea typeface="+mn-ea"/>
-                <a:cs typeface="+mn-cs"/>
-              </a:defRPr>
-            </a:lvl3pPr>
-            <a:lvl4pPr marL="1600200" indent="-228600" algn="l" defTabSz="914400" rtl="0" eaLnBrk="1" latinLnBrk="0" hangingPunct="1">
-              <a:lnSpc>
-                <a:spcPct val="90000"/>
-              </a:lnSpc>
-              <a:spcBef>
-                <a:spcPts val="500"/>
-              </a:spcBef>
-              <a:buFont typeface="Arial" panose="020B0604020202020204" pitchFamily="34" charset="0"/>
-              <a:buChar char="•"/>
-              <a:defRPr sz="1800" kern="1200">
-                <a:solidFill>
-                  <a:schemeClr val="tx1"/>
-                </a:solidFill>
-                <a:latin typeface="+mn-lt"/>
-                <a:ea typeface="+mn-ea"/>
-                <a:cs typeface="+mn-cs"/>
-              </a:defRPr>
-            </a:lvl4pPr>
-            <a:lvl5pPr marL="2057400" indent="-228600" algn="l" defTabSz="914400" rtl="0" eaLnBrk="1" latinLnBrk="0" hangingPunct="1">
-              <a:lnSpc>
-                <a:spcPct val="90000"/>
-              </a:lnSpc>
-              <a:spcBef>
-                <a:spcPts val="500"/>
-              </a:spcBef>
-              <a:buFont typeface="Arial" panose="020B0604020202020204" pitchFamily="34" charset="0"/>
-              <a:buChar char="•"/>
-              <a:defRPr sz="1800" kern="1200">
-                <a:solidFill>
-                  <a:schemeClr val="tx1"/>
-                </a:solidFill>
-                <a:latin typeface="+mn-lt"/>
-                <a:ea typeface="+mn-ea"/>
-                <a:cs typeface="+mn-cs"/>
-              </a:defRPr>
-            </a:lvl5pPr>
-            <a:lvl6pPr marL="2514600" indent="-228600" algn="l" defTabSz="914400" rtl="0" eaLnBrk="1" latinLnBrk="0" hangingPunct="1">
-              <a:lnSpc>
-                <a:spcPct val="90000"/>
-              </a:lnSpc>
-              <a:spcBef>
-                <a:spcPts val="500"/>
-              </a:spcBef>
-              <a:buFont typeface="Arial" panose="020B0604020202020204" pitchFamily="34" charset="0"/>
-              <a:buChar char="•"/>
-              <a:defRPr sz="1800" kern="1200">
-                <a:solidFill>
-                  <a:schemeClr val="tx1"/>
-                </a:solidFill>
-                <a:latin typeface="+mn-lt"/>
-                <a:ea typeface="+mn-ea"/>
-                <a:cs typeface="+mn-cs"/>
-              </a:defRPr>
-            </a:lvl6pPr>
-            <a:lvl7pPr marL="2971800" indent="-228600" algn="l" defTabSz="914400" rtl="0" eaLnBrk="1" latinLnBrk="0" hangingPunct="1">
-              <a:lnSpc>
-                <a:spcPct val="90000"/>
-              </a:lnSpc>
-              <a:spcBef>
-                <a:spcPts val="500"/>
-              </a:spcBef>
-              <a:buFont typeface="Arial" panose="020B0604020202020204" pitchFamily="34" charset="0"/>
-              <a:buChar char="•"/>
-              <a:defRPr sz="1800" kern="1200">
-                <a:solidFill>
-                  <a:schemeClr val="tx1"/>
-                </a:solidFill>
-                <a:latin typeface="+mn-lt"/>
-                <a:ea typeface="+mn-ea"/>
-                <a:cs typeface="+mn-cs"/>
-              </a:defRPr>
-            </a:lvl7pPr>
-            <a:lvl8pPr marL="3429000" indent="-228600" algn="l" defTabSz="914400" rtl="0" eaLnBrk="1" latinLnBrk="0" hangingPunct="1">
-              <a:lnSpc>
-                <a:spcPct val="90000"/>
-              </a:lnSpc>
-              <a:spcBef>
-                <a:spcPts val="500"/>
-              </a:spcBef>
-              <a:buFont typeface="Arial" panose="020B0604020202020204" pitchFamily="34" charset="0"/>
-              <a:buChar char="•"/>
-              <a:defRPr sz="1800" kern="1200">
-                <a:solidFill>
-                  <a:schemeClr val="tx1"/>
-                </a:solidFill>
-                <a:latin typeface="+mn-lt"/>
-                <a:ea typeface="+mn-ea"/>
-                <a:cs typeface="+mn-cs"/>
-              </a:defRPr>
-            </a:lvl8pPr>
-            <a:lvl9pPr marL="3886200" indent="-228600" algn="l" defTabSz="914400" rtl="0" eaLnBrk="1" latinLnBrk="0" hangingPunct="1">
-              <a:lnSpc>
-                <a:spcPct val="90000"/>
-              </a:lnSpc>
-              <a:spcBef>
-                <a:spcPts val="500"/>
-              </a:spcBef>
-              <a:buFont typeface="Arial" panose="020B0604020202020204" pitchFamily="34" charset="0"/>
-              <a:buChar char="•"/>
-              <a:defRPr sz="1800" kern="1200">
-                <a:solidFill>
-                  <a:schemeClr val="tx1"/>
-                </a:solidFill>
-                <a:latin typeface="+mn-lt"/>
-                <a:ea typeface="+mn-ea"/>
-                <a:cs typeface="+mn-cs"/>
-              </a:defRPr>
-            </a:lvl9pPr>
-          </a:lstStyle>
+          <a:lstStyle/>
           <a:p>
             <a:pPr marL="0" indent="0" algn="ctr">
-              <a:buFont typeface="Arial" panose="020B0604020202020204" pitchFamily="34" charset="0"/>
               <a:buNone/>
             </a:pPr>
             <a:r>
@@ -8777,7 +8730,6 @@
           </a:p>
           <a:p>
             <a:pPr marL="0" indent="0" algn="ctr">
-              <a:buFont typeface="Arial" panose="020B0604020202020204" pitchFamily="34" charset="0"/>
               <a:buNone/>
             </a:pPr>
             <a:r>
@@ -8785,21 +8737,77 @@
                 <a:latin typeface="Segoe UI" panose="020B0502040204020203" pitchFamily="34" charset="0"/>
                 <a:cs typeface="Segoe UI" panose="020B0502040204020203" pitchFamily="34" charset="0"/>
               </a:rPr>
-              <a:t>בלוק מספר 5 מתוך 8 הסתיים.</a:t>
-            </a:r>
-          </a:p>
-          <a:p>
-            <a:pPr marL="0" indent="0" algn="ctr">
-              <a:buFont typeface="Arial" panose="020B0604020202020204" pitchFamily="34" charset="0"/>
-              <a:buNone/>
-            </a:pPr>
+              <a:t>בלוק מספר </a:t>
+            </a:r>
+            <a:r>
+              <a:rPr lang="he-IL" sz="1800" dirty="0" smtClean="0">
+                <a:latin typeface="Segoe UI" panose="020B0502040204020203" pitchFamily="34" charset="0"/>
+                <a:cs typeface="Segoe UI" panose="020B0502040204020203" pitchFamily="34" charset="0"/>
+              </a:rPr>
+              <a:t>5 </a:t>
+            </a:r>
             <a:r>
               <a:rPr lang="he-IL" sz="1800" dirty="0">
                 <a:latin typeface="Segoe UI" panose="020B0502040204020203" pitchFamily="34" charset="0"/>
                 <a:cs typeface="Segoe UI" panose="020B0502040204020203" pitchFamily="34" charset="0"/>
               </a:rPr>
-              <a:t>אתה יכול התמתח קצת ולקחת הפסקה קצרה בזמן שאתה יושב בכיסא.</a:t>
-            </a:r>
+              <a:t>מתוך 8 הסתיים.</a:t>
+            </a:r>
+          </a:p>
+          <a:p>
+            <a:pPr marL="0" indent="0" algn="ctr">
+              <a:buNone/>
+            </a:pPr>
+            <a:r>
+              <a:rPr lang="he-IL" sz="1800" dirty="0">
+                <a:latin typeface="Segoe UI" panose="020B0502040204020203" pitchFamily="34" charset="0"/>
+                <a:cs typeface="Segoe UI" panose="020B0502040204020203" pitchFamily="34" charset="0"/>
+              </a:rPr>
+              <a:t>אתה יכול </a:t>
+            </a:r>
+            <a:r>
+              <a:rPr lang="he-IL" sz="1800" dirty="0" smtClean="0">
+                <a:latin typeface="Segoe UI" panose="020B0502040204020203" pitchFamily="34" charset="0"/>
+                <a:cs typeface="Segoe UI" panose="020B0502040204020203" pitchFamily="34" charset="0"/>
+              </a:rPr>
+              <a:t>להתמתח </a:t>
+            </a:r>
+            <a:r>
+              <a:rPr lang="he-IL" sz="1800" dirty="0">
+                <a:latin typeface="Segoe UI" panose="020B0502040204020203" pitchFamily="34" charset="0"/>
+                <a:cs typeface="Segoe UI" panose="020B0502040204020203" pitchFamily="34" charset="0"/>
+              </a:rPr>
+              <a:t>קצת ולקחת הפסקה קצרה בזמן שאתה יושב בכיסא</a:t>
+            </a:r>
+            <a:r>
+              <a:rPr lang="he-IL" sz="1800" dirty="0" smtClean="0">
+                <a:latin typeface="Segoe UI" panose="020B0502040204020203" pitchFamily="34" charset="0"/>
+                <a:cs typeface="Segoe UI" panose="020B0502040204020203" pitchFamily="34" charset="0"/>
+              </a:rPr>
+              <a:t>.</a:t>
+            </a:r>
+            <a:endParaRPr lang="en-US" sz="1800" dirty="0" smtClean="0">
+              <a:latin typeface="Segoe UI" panose="020B0502040204020203" pitchFamily="34" charset="0"/>
+              <a:cs typeface="Segoe UI" panose="020B0502040204020203" pitchFamily="34" charset="0"/>
+            </a:endParaRPr>
+          </a:p>
+          <a:p>
+            <a:pPr marL="0" indent="0" algn="ctr">
+              <a:buNone/>
+            </a:pPr>
+            <a:endParaRPr lang="en-US" sz="1800" dirty="0">
+              <a:latin typeface="Segoe UI" panose="020B0502040204020203" pitchFamily="34" charset="0"/>
+              <a:cs typeface="Segoe UI" panose="020B0502040204020203" pitchFamily="34" charset="0"/>
+            </a:endParaRPr>
+          </a:p>
+          <a:p>
+            <a:pPr marL="0" indent="0" algn="ctr">
+              <a:buNone/>
+            </a:pPr>
+            <a:endParaRPr lang="he-IL" sz="1800" dirty="0">
+              <a:latin typeface="Segoe UI" panose="020B0502040204020203" pitchFamily="34" charset="0"/>
+              <a:cs typeface="Segoe UI" panose="020B0502040204020203" pitchFamily="34" charset="0"/>
+            </a:endParaRPr>
           </a:p>
         </p:txBody>
       </p:sp>
@@ -8844,10 +8852,108 @@
           </a:p>
         </p:txBody>
       </p:sp>
+      <p:sp>
+        <p:nvSpPr>
+          <p:cNvPr id="2" name="TextBox 1"/>
+          <p:cNvSpPr txBox="1"/>
+          <p:nvPr/>
+        </p:nvSpPr>
+        <p:spPr>
+          <a:xfrm>
+            <a:off x="6668236" y="3218812"/>
+            <a:ext cx="860326" cy="369332"/>
+          </a:xfrm>
+          <a:prstGeom prst="rect">
+            <a:avLst/>
+          </a:prstGeom>
+          <a:noFill/>
+        </p:spPr>
+        <p:txBody>
+          <a:bodyPr wrap="square" rtlCol="0">
+            <a:spAutoFit/>
+          </a:bodyPr>
+          <a:lstStyle/>
+          <a:p>
+            <a:r>
+              <a:rPr lang="he-IL" dirty="0" smtClean="0"/>
+              <a:t>אספת</a:t>
+            </a:r>
+            <a:endParaRPr lang="en-US" dirty="0"/>
+          </a:p>
+        </p:txBody>
+      </p:sp>
+      <p:sp>
+        <p:nvSpPr>
+          <p:cNvPr id="5" name="TextBox 4"/>
+          <p:cNvSpPr txBox="1"/>
+          <p:nvPr/>
+        </p:nvSpPr>
+        <p:spPr>
+          <a:xfrm>
+            <a:off x="4551260" y="3218812"/>
+            <a:ext cx="1087540" cy="369332"/>
+          </a:xfrm>
+          <a:prstGeom prst="rect">
+            <a:avLst/>
+          </a:prstGeom>
+          <a:noFill/>
+        </p:spPr>
+        <p:txBody>
+          <a:bodyPr wrap="square" rtlCol="0">
+            <a:spAutoFit/>
+          </a:bodyPr>
+          <a:lstStyle/>
+          <a:p>
+            <a:r>
+              <a:rPr lang="he-IL" dirty="0" smtClean="0"/>
+              <a:t>מטבעות</a:t>
+            </a:r>
+            <a:endParaRPr lang="en-US" dirty="0"/>
+          </a:p>
+        </p:txBody>
+      </p:sp>
+      <p:sp>
+        <p:nvSpPr>
+          <p:cNvPr id="6" name="TextBox 5">
+            <a:extLst>
+              <a:ext uri="{FF2B5EF4-FFF2-40B4-BE49-F238E27FC236}">
+                <a16:creationId xmlns:a16="http://schemas.microsoft.com/office/drawing/2014/main" id="{60D9569B-6FF1-E6D8-3D9C-6523D58A9BA8}"/>
+              </a:ext>
+            </a:extLst>
+          </p:cNvPr>
+          <p:cNvSpPr txBox="1"/>
+          <p:nvPr/>
+        </p:nvSpPr>
+        <p:spPr>
+          <a:xfrm>
+            <a:off x="5638800" y="3244334"/>
+            <a:ext cx="914400" cy="369332"/>
+          </a:xfrm>
+          <a:prstGeom prst="rect">
+            <a:avLst/>
+          </a:prstGeom>
+          <a:noFill/>
+          <a:ln>
+            <a:solidFill>
+              <a:schemeClr val="tx1"/>
+            </a:solidFill>
+          </a:ln>
+        </p:spPr>
+        <p:txBody>
+          <a:bodyPr wrap="square" rtlCol="1">
+            <a:spAutoFit/>
+          </a:bodyPr>
+          <a:lstStyle/>
+          <a:p>
+            <a:pPr algn="ctr"/>
+            <a:endParaRPr lang="he-IL" dirty="0"/>
+          </a:p>
+        </p:txBody>
+      </p:sp>
     </p:spTree>
     <p:extLst>
       <p:ext uri="{BB962C8B-B14F-4D97-AF65-F5344CB8AC3E}">
-        <p14:creationId xmlns:p14="http://schemas.microsoft.com/office/powerpoint/2010/main" val="4265504923"/>
+        <p14:creationId xmlns:p14="http://schemas.microsoft.com/office/powerpoint/2010/main" val="480117890"/>
       </p:ext>
     </p:extLst>
   </p:cSld>
@@ -8879,195 +8985,30 @@
           <p:cNvPr id="4" name="Content Placeholder 2">
             <a:extLst>
               <a:ext uri="{FF2B5EF4-FFF2-40B4-BE49-F238E27FC236}">
-                <a16:creationId xmlns:a16="http://schemas.microsoft.com/office/drawing/2014/main" id="{8F9B38A6-30DE-4D3B-FA22-C7718D967EE1}"/>
-              </a:ext>
-            </a:extLst>
-          </p:cNvPr>
-          <p:cNvSpPr txBox="1">
-            <a:spLocks/>
+                <a16:creationId xmlns:a16="http://schemas.microsoft.com/office/drawing/2014/main" id="{F338F7C3-1DA3-FC02-A5C3-CA618AC932DC}"/>
+              </a:ext>
+            </a:extLst>
+          </p:cNvPr>
+          <p:cNvSpPr>
+            <a:spLocks noGrp="1"/>
           </p:cNvSpPr>
-          <p:nvPr/>
-        </p:nvSpPr>
-        <p:spPr>
-          <a:xfrm>
-            <a:off x="990600" y="1978025"/>
+          <p:nvPr>
+            <p:ph idx="1"/>
+          </p:nvPr>
+        </p:nvSpPr>
+        <p:spPr>
+          <a:xfrm>
+            <a:off x="838200" y="1825625"/>
             <a:ext cx="10515600" cy="4351338"/>
           </a:xfrm>
-          <a:prstGeom prst="rect">
-            <a:avLst/>
-          </a:prstGeom>
-        </p:spPr>
-        <p:txBody>
-          <a:bodyPr vert="horz" lIns="91440" tIns="45720" rIns="91440" bIns="45720" rtlCol="0">
+        </p:spPr>
+        <p:txBody>
+          <a:bodyPr>
             <a:normAutofit/>
           </a:bodyPr>
-          <a:lstStyle>
-            <a:lvl1pPr marL="228600" indent="-228600" algn="l" defTabSz="914400" rtl="0" eaLnBrk="1" latinLnBrk="0" hangingPunct="1">
-              <a:lnSpc>
-                <a:spcPct val="90000"/>
-              </a:lnSpc>
-              <a:spcBef>
-                <a:spcPts val="1000"/>
-              </a:spcBef>
-              <a:buFont typeface="Arial" panose="020B0604020202020204" pitchFamily="34" charset="0"/>
-              <a:buChar char="•"/>
-              <a:defRPr sz="2800" kern="1200">
-                <a:solidFill>
-                  <a:schemeClr val="tx1"/>
-                </a:solidFill>
-                <a:latin typeface="+mn-lt"/>
-                <a:ea typeface="+mn-ea"/>
-                <a:cs typeface="+mn-cs"/>
-              </a:defRPr>
-            </a:lvl1pPr>
-            <a:lvl2pPr marL="685800" indent="-228600" algn="l" defTabSz="914400" rtl="0" eaLnBrk="1" latinLnBrk="0" hangingPunct="1">
-              <a:lnSpc>
-                <a:spcPct val="90000"/>
-              </a:lnSpc>
-              <a:spcBef>
-                <a:spcPts val="500"/>
-              </a:spcBef>
-              <a:buFont typeface="Arial" panose="020B0604020202020204" pitchFamily="34" charset="0"/>
-              <a:buChar char="•"/>
-              <a:defRPr sz="2400" kern="1200">
-                <a:solidFill>
-                  <a:schemeClr val="tx1"/>
-                </a:solidFill>
-                <a:latin typeface="+mn-lt"/>
-                <a:ea typeface="+mn-ea"/>
-                <a:cs typeface="+mn-cs"/>
-              </a:defRPr>
-            </a:lvl2pPr>
-            <a:lvl3pPr marL="1143000" indent="-228600" algn="l" defTabSz="914400" rtl="0" eaLnBrk="1" latinLnBrk="0" hangingPunct="1">
-              <a:lnSpc>
-                <a:spcPct val="90000"/>
-              </a:lnSpc>
-              <a:spcBef>
-                <a:spcPts val="500"/>
-              </a:spcBef>
-              <a:buFont typeface="Arial" panose="020B0604020202020204" pitchFamily="34" charset="0"/>
-              <a:buChar char="•"/>
-              <a:defRPr sz="2000" kern="1200">
-                <a:solidFill>
-                  <a:schemeClr val="tx1"/>
-                </a:solidFill>
-                <a:latin typeface="+mn-lt"/>
-                <a:ea typeface="+mn-ea"/>
-                <a:cs typeface="+mn-cs"/>
-              </a:defRPr>
-            </a:lvl3pPr>
-            <a:lvl4pPr marL="1600200" indent="-228600" algn="l" defTabSz="914400" rtl="0" eaLnBrk="1" latinLnBrk="0" hangingPunct="1">
-              <a:lnSpc>
-                <a:spcPct val="90000"/>
-              </a:lnSpc>
-              <a:spcBef>
-                <a:spcPts val="500"/>
-              </a:spcBef>
-              <a:buFont typeface="Arial" panose="020B0604020202020204" pitchFamily="34" charset="0"/>
-              <a:buChar char="•"/>
-              <a:defRPr sz="1800" kern="1200">
-                <a:solidFill>
-                  <a:schemeClr val="tx1"/>
-                </a:solidFill>
-                <a:latin typeface="+mn-lt"/>
-                <a:ea typeface="+mn-ea"/>
-                <a:cs typeface="+mn-cs"/>
-              </a:defRPr>
-            </a:lvl4pPr>
-            <a:lvl5pPr marL="2057400" indent="-228600" algn="l" defTabSz="914400" rtl="0" eaLnBrk="1" latinLnBrk="0" hangingPunct="1">
-              <a:lnSpc>
-                <a:spcPct val="90000"/>
-              </a:lnSpc>
-              <a:spcBef>
-                <a:spcPts val="500"/>
-              </a:spcBef>
-              <a:buFont typeface="Arial" panose="020B0604020202020204" pitchFamily="34" charset="0"/>
-              <a:buChar char="•"/>
-              <a:defRPr sz="1800" kern="1200">
-                <a:solidFill>
-                  <a:schemeClr val="tx1"/>
-                </a:solidFill>
-                <a:latin typeface="+mn-lt"/>
-                <a:ea typeface="+mn-ea"/>
-                <a:cs typeface="+mn-cs"/>
-              </a:defRPr>
-            </a:lvl5pPr>
-            <a:lvl6pPr marL="2514600" indent="-228600" algn="l" defTabSz="914400" rtl="0" eaLnBrk="1" latinLnBrk="0" hangingPunct="1">
-              <a:lnSpc>
-                <a:spcPct val="90000"/>
-              </a:lnSpc>
-              <a:spcBef>
-                <a:spcPts val="500"/>
-              </a:spcBef>
-              <a:buFont typeface="Arial" panose="020B0604020202020204" pitchFamily="34" charset="0"/>
-              <a:buChar char="•"/>
-              <a:defRPr sz="1800" kern="1200">
-                <a:solidFill>
-                  <a:schemeClr val="tx1"/>
-                </a:solidFill>
-                <a:latin typeface="+mn-lt"/>
-                <a:ea typeface="+mn-ea"/>
-                <a:cs typeface="+mn-cs"/>
-              </a:defRPr>
-            </a:lvl6pPr>
-            <a:lvl7pPr marL="2971800" indent="-228600" algn="l" defTabSz="914400" rtl="0" eaLnBrk="1" latinLnBrk="0" hangingPunct="1">
-              <a:lnSpc>
-                <a:spcPct val="90000"/>
-              </a:lnSpc>
-              <a:spcBef>
-                <a:spcPts val="500"/>
-              </a:spcBef>
-              <a:buFont typeface="Arial" panose="020B0604020202020204" pitchFamily="34" charset="0"/>
-              <a:buChar char="•"/>
-              <a:defRPr sz="1800" kern="1200">
-                <a:solidFill>
-                  <a:schemeClr val="tx1"/>
-                </a:solidFill>
-                <a:latin typeface="+mn-lt"/>
-                <a:ea typeface="+mn-ea"/>
-                <a:cs typeface="+mn-cs"/>
-              </a:defRPr>
-            </a:lvl7pPr>
-            <a:lvl8pPr marL="3429000" indent="-228600" algn="l" defTabSz="914400" rtl="0" eaLnBrk="1" latinLnBrk="0" hangingPunct="1">
-              <a:lnSpc>
-                <a:spcPct val="90000"/>
-              </a:lnSpc>
-              <a:spcBef>
-                <a:spcPts val="500"/>
-              </a:spcBef>
-              <a:buFont typeface="Arial" panose="020B0604020202020204" pitchFamily="34" charset="0"/>
-              <a:buChar char="•"/>
-              <a:defRPr sz="1800" kern="1200">
-                <a:solidFill>
-                  <a:schemeClr val="tx1"/>
-                </a:solidFill>
-                <a:latin typeface="+mn-lt"/>
-                <a:ea typeface="+mn-ea"/>
-                <a:cs typeface="+mn-cs"/>
-              </a:defRPr>
-            </a:lvl8pPr>
-            <a:lvl9pPr marL="3886200" indent="-228600" algn="l" defTabSz="914400" rtl="0" eaLnBrk="1" latinLnBrk="0" hangingPunct="1">
-              <a:lnSpc>
-                <a:spcPct val="90000"/>
-              </a:lnSpc>
-              <a:spcBef>
-                <a:spcPts val="500"/>
-              </a:spcBef>
-              <a:buFont typeface="Arial" panose="020B0604020202020204" pitchFamily="34" charset="0"/>
-              <a:buChar char="•"/>
-              <a:defRPr sz="1800" kern="1200">
-                <a:solidFill>
-                  <a:schemeClr val="tx1"/>
-                </a:solidFill>
-                <a:latin typeface="+mn-lt"/>
-                <a:ea typeface="+mn-ea"/>
-                <a:cs typeface="+mn-cs"/>
-              </a:defRPr>
-            </a:lvl9pPr>
-          </a:lstStyle>
+          <a:lstStyle/>
           <a:p>
             <a:pPr marL="0" indent="0" algn="ctr">
-              <a:buFont typeface="Arial" panose="020B0604020202020204" pitchFamily="34" charset="0"/>
               <a:buNone/>
             </a:pPr>
             <a:r>
@@ -9080,7 +9021,6 @@
           </a:p>
           <a:p>
             <a:pPr marL="0" indent="0" algn="ctr">
-              <a:buFont typeface="Arial" panose="020B0604020202020204" pitchFamily="34" charset="0"/>
               <a:buNone/>
             </a:pPr>
             <a:r>
@@ -9088,21 +9028,77 @@
                 <a:latin typeface="Segoe UI" panose="020B0502040204020203" pitchFamily="34" charset="0"/>
                 <a:cs typeface="Segoe UI" panose="020B0502040204020203" pitchFamily="34" charset="0"/>
               </a:rPr>
-              <a:t>בלוק מספר 6 מתוך 8 הסתיים.</a:t>
-            </a:r>
-          </a:p>
-          <a:p>
-            <a:pPr marL="0" indent="0" algn="ctr">
-              <a:buFont typeface="Arial" panose="020B0604020202020204" pitchFamily="34" charset="0"/>
-              <a:buNone/>
-            </a:pPr>
+              <a:t>בלוק מספר </a:t>
+            </a:r>
+            <a:r>
+              <a:rPr lang="he-IL" sz="1800" dirty="0" smtClean="0">
+                <a:latin typeface="Segoe UI" panose="020B0502040204020203" pitchFamily="34" charset="0"/>
+                <a:cs typeface="Segoe UI" panose="020B0502040204020203" pitchFamily="34" charset="0"/>
+              </a:rPr>
+              <a:t>6 </a:t>
+            </a:r>
             <a:r>
               <a:rPr lang="he-IL" sz="1800" dirty="0">
                 <a:latin typeface="Segoe UI" panose="020B0502040204020203" pitchFamily="34" charset="0"/>
                 <a:cs typeface="Segoe UI" panose="020B0502040204020203" pitchFamily="34" charset="0"/>
               </a:rPr>
-              <a:t>אתה יכול התמתח קצת ולקחת הפסקה קצרה בזמן שאתה יושב בכיסא.</a:t>
-            </a:r>
+              <a:t>מתוך 8 הסתיים.</a:t>
+            </a:r>
+          </a:p>
+          <a:p>
+            <a:pPr marL="0" indent="0" algn="ctr">
+              <a:buNone/>
+            </a:pPr>
+            <a:r>
+              <a:rPr lang="he-IL" sz="1800" dirty="0">
+                <a:latin typeface="Segoe UI" panose="020B0502040204020203" pitchFamily="34" charset="0"/>
+                <a:cs typeface="Segoe UI" panose="020B0502040204020203" pitchFamily="34" charset="0"/>
+              </a:rPr>
+              <a:t>אתה יכול </a:t>
+            </a:r>
+            <a:r>
+              <a:rPr lang="he-IL" sz="1800" dirty="0" smtClean="0">
+                <a:latin typeface="Segoe UI" panose="020B0502040204020203" pitchFamily="34" charset="0"/>
+                <a:cs typeface="Segoe UI" panose="020B0502040204020203" pitchFamily="34" charset="0"/>
+              </a:rPr>
+              <a:t>להתמתח </a:t>
+            </a:r>
+            <a:r>
+              <a:rPr lang="he-IL" sz="1800" dirty="0">
+                <a:latin typeface="Segoe UI" panose="020B0502040204020203" pitchFamily="34" charset="0"/>
+                <a:cs typeface="Segoe UI" panose="020B0502040204020203" pitchFamily="34" charset="0"/>
+              </a:rPr>
+              <a:t>קצת ולקחת הפסקה קצרה בזמן שאתה יושב בכיסא</a:t>
+            </a:r>
+            <a:r>
+              <a:rPr lang="he-IL" sz="1800" dirty="0" smtClean="0">
+                <a:latin typeface="Segoe UI" panose="020B0502040204020203" pitchFamily="34" charset="0"/>
+                <a:cs typeface="Segoe UI" panose="020B0502040204020203" pitchFamily="34" charset="0"/>
+              </a:rPr>
+              <a:t>.</a:t>
+            </a:r>
+            <a:endParaRPr lang="en-US" sz="1800" dirty="0" smtClean="0">
+              <a:latin typeface="Segoe UI" panose="020B0502040204020203" pitchFamily="34" charset="0"/>
+              <a:cs typeface="Segoe UI" panose="020B0502040204020203" pitchFamily="34" charset="0"/>
+            </a:endParaRPr>
+          </a:p>
+          <a:p>
+            <a:pPr marL="0" indent="0" algn="ctr">
+              <a:buNone/>
+            </a:pPr>
+            <a:endParaRPr lang="en-US" sz="1800" dirty="0">
+              <a:latin typeface="Segoe UI" panose="020B0502040204020203" pitchFamily="34" charset="0"/>
+              <a:cs typeface="Segoe UI" panose="020B0502040204020203" pitchFamily="34" charset="0"/>
+            </a:endParaRPr>
+          </a:p>
+          <a:p>
+            <a:pPr marL="0" indent="0" algn="ctr">
+              <a:buNone/>
+            </a:pPr>
+            <a:endParaRPr lang="he-IL" sz="1800" dirty="0">
+              <a:latin typeface="Segoe UI" panose="020B0502040204020203" pitchFamily="34" charset="0"/>
+              <a:cs typeface="Segoe UI" panose="020B0502040204020203" pitchFamily="34" charset="0"/>
+            </a:endParaRPr>
           </a:p>
         </p:txBody>
       </p:sp>
@@ -9147,10 +9143,108 @@
           </a:p>
         </p:txBody>
       </p:sp>
+      <p:sp>
+        <p:nvSpPr>
+          <p:cNvPr id="2" name="TextBox 1"/>
+          <p:cNvSpPr txBox="1"/>
+          <p:nvPr/>
+        </p:nvSpPr>
+        <p:spPr>
+          <a:xfrm>
+            <a:off x="6668236" y="3218812"/>
+            <a:ext cx="860326" cy="369332"/>
+          </a:xfrm>
+          <a:prstGeom prst="rect">
+            <a:avLst/>
+          </a:prstGeom>
+          <a:noFill/>
+        </p:spPr>
+        <p:txBody>
+          <a:bodyPr wrap="square" rtlCol="0">
+            <a:spAutoFit/>
+          </a:bodyPr>
+          <a:lstStyle/>
+          <a:p>
+            <a:r>
+              <a:rPr lang="he-IL" dirty="0" smtClean="0"/>
+              <a:t>אספת</a:t>
+            </a:r>
+            <a:endParaRPr lang="en-US" dirty="0"/>
+          </a:p>
+        </p:txBody>
+      </p:sp>
+      <p:sp>
+        <p:nvSpPr>
+          <p:cNvPr id="5" name="TextBox 4"/>
+          <p:cNvSpPr txBox="1"/>
+          <p:nvPr/>
+        </p:nvSpPr>
+        <p:spPr>
+          <a:xfrm>
+            <a:off x="4551260" y="3218812"/>
+            <a:ext cx="1087540" cy="369332"/>
+          </a:xfrm>
+          <a:prstGeom prst="rect">
+            <a:avLst/>
+          </a:prstGeom>
+          <a:noFill/>
+        </p:spPr>
+        <p:txBody>
+          <a:bodyPr wrap="square" rtlCol="0">
+            <a:spAutoFit/>
+          </a:bodyPr>
+          <a:lstStyle/>
+          <a:p>
+            <a:r>
+              <a:rPr lang="he-IL" dirty="0" smtClean="0"/>
+              <a:t>מטבעות</a:t>
+            </a:r>
+            <a:endParaRPr lang="en-US" dirty="0"/>
+          </a:p>
+        </p:txBody>
+      </p:sp>
+      <p:sp>
+        <p:nvSpPr>
+          <p:cNvPr id="6" name="TextBox 5">
+            <a:extLst>
+              <a:ext uri="{FF2B5EF4-FFF2-40B4-BE49-F238E27FC236}">
+                <a16:creationId xmlns:a16="http://schemas.microsoft.com/office/drawing/2014/main" id="{60D9569B-6FF1-E6D8-3D9C-6523D58A9BA8}"/>
+              </a:ext>
+            </a:extLst>
+          </p:cNvPr>
+          <p:cNvSpPr txBox="1"/>
+          <p:nvPr/>
+        </p:nvSpPr>
+        <p:spPr>
+          <a:xfrm>
+            <a:off x="5638800" y="3244334"/>
+            <a:ext cx="914400" cy="369332"/>
+          </a:xfrm>
+          <a:prstGeom prst="rect">
+            <a:avLst/>
+          </a:prstGeom>
+          <a:noFill/>
+          <a:ln>
+            <a:solidFill>
+              <a:schemeClr val="tx1"/>
+            </a:solidFill>
+          </a:ln>
+        </p:spPr>
+        <p:txBody>
+          <a:bodyPr wrap="square" rtlCol="1">
+            <a:spAutoFit/>
+          </a:bodyPr>
+          <a:lstStyle/>
+          <a:p>
+            <a:pPr algn="ctr"/>
+            <a:endParaRPr lang="he-IL" dirty="0"/>
+          </a:p>
+        </p:txBody>
+      </p:sp>
     </p:spTree>
     <p:extLst>
       <p:ext uri="{BB962C8B-B14F-4D97-AF65-F5344CB8AC3E}">
-        <p14:creationId xmlns:p14="http://schemas.microsoft.com/office/powerpoint/2010/main" val="2908352063"/>
+        <p14:creationId xmlns:p14="http://schemas.microsoft.com/office/powerpoint/2010/main" val="4010082262"/>
       </p:ext>
     </p:extLst>
   </p:cSld>
@@ -9182,195 +9276,30 @@
           <p:cNvPr id="4" name="Content Placeholder 2">
             <a:extLst>
               <a:ext uri="{FF2B5EF4-FFF2-40B4-BE49-F238E27FC236}">
-                <a16:creationId xmlns:a16="http://schemas.microsoft.com/office/drawing/2014/main" id="{3491D6AB-D06E-D389-FB57-0B77AF49265C}"/>
-              </a:ext>
-            </a:extLst>
-          </p:cNvPr>
-          <p:cNvSpPr txBox="1">
-            <a:spLocks/>
+                <a16:creationId xmlns:a16="http://schemas.microsoft.com/office/drawing/2014/main" id="{F338F7C3-1DA3-FC02-A5C3-CA618AC932DC}"/>
+              </a:ext>
+            </a:extLst>
+          </p:cNvPr>
+          <p:cNvSpPr>
+            <a:spLocks noGrp="1"/>
           </p:cNvSpPr>
-          <p:nvPr/>
-        </p:nvSpPr>
-        <p:spPr>
-          <a:xfrm>
-            <a:off x="990600" y="1978025"/>
+          <p:nvPr>
+            <p:ph idx="1"/>
+          </p:nvPr>
+        </p:nvSpPr>
+        <p:spPr>
+          <a:xfrm>
+            <a:off x="838200" y="1825625"/>
             <a:ext cx="10515600" cy="4351338"/>
           </a:xfrm>
-          <a:prstGeom prst="rect">
-            <a:avLst/>
-          </a:prstGeom>
-        </p:spPr>
-        <p:txBody>
-          <a:bodyPr vert="horz" lIns="91440" tIns="45720" rIns="91440" bIns="45720" rtlCol="0">
+        </p:spPr>
+        <p:txBody>
+          <a:bodyPr>
             <a:normAutofit/>
           </a:bodyPr>
-          <a:lstStyle>
-            <a:lvl1pPr marL="228600" indent="-228600" algn="l" defTabSz="914400" rtl="0" eaLnBrk="1" latinLnBrk="0" hangingPunct="1">
-              <a:lnSpc>
-                <a:spcPct val="90000"/>
-              </a:lnSpc>
-              <a:spcBef>
-                <a:spcPts val="1000"/>
-              </a:spcBef>
-              <a:buFont typeface="Arial" panose="020B0604020202020204" pitchFamily="34" charset="0"/>
-              <a:buChar char="•"/>
-              <a:defRPr sz="2800" kern="1200">
-                <a:solidFill>
-                  <a:schemeClr val="tx1"/>
-                </a:solidFill>
-                <a:latin typeface="+mn-lt"/>
-                <a:ea typeface="+mn-ea"/>
-                <a:cs typeface="+mn-cs"/>
-              </a:defRPr>
-            </a:lvl1pPr>
-            <a:lvl2pPr marL="685800" indent="-228600" algn="l" defTabSz="914400" rtl="0" eaLnBrk="1" latinLnBrk="0" hangingPunct="1">
-              <a:lnSpc>
-                <a:spcPct val="90000"/>
-              </a:lnSpc>
-              <a:spcBef>
-                <a:spcPts val="500"/>
-              </a:spcBef>
-              <a:buFont typeface="Arial" panose="020B0604020202020204" pitchFamily="34" charset="0"/>
-              <a:buChar char="•"/>
-              <a:defRPr sz="2400" kern="1200">
-                <a:solidFill>
-                  <a:schemeClr val="tx1"/>
-                </a:solidFill>
-                <a:latin typeface="+mn-lt"/>
-                <a:ea typeface="+mn-ea"/>
-                <a:cs typeface="+mn-cs"/>
-              </a:defRPr>
-            </a:lvl2pPr>
-            <a:lvl3pPr marL="1143000" indent="-228600" algn="l" defTabSz="914400" rtl="0" eaLnBrk="1" latinLnBrk="0" hangingPunct="1">
-              <a:lnSpc>
-                <a:spcPct val="90000"/>
-              </a:lnSpc>
-              <a:spcBef>
-                <a:spcPts val="500"/>
-              </a:spcBef>
-              <a:buFont typeface="Arial" panose="020B0604020202020204" pitchFamily="34" charset="0"/>
-              <a:buChar char="•"/>
-              <a:defRPr sz="2000" kern="1200">
-                <a:solidFill>
-                  <a:schemeClr val="tx1"/>
-                </a:solidFill>
-                <a:latin typeface="+mn-lt"/>
-                <a:ea typeface="+mn-ea"/>
-                <a:cs typeface="+mn-cs"/>
-              </a:defRPr>
-            </a:lvl3pPr>
-            <a:lvl4pPr marL="1600200" indent="-228600" algn="l" defTabSz="914400" rtl="0" eaLnBrk="1" latinLnBrk="0" hangingPunct="1">
-              <a:lnSpc>
-                <a:spcPct val="90000"/>
-              </a:lnSpc>
-              <a:spcBef>
-                <a:spcPts val="500"/>
-              </a:spcBef>
-              <a:buFont typeface="Arial" panose="020B0604020202020204" pitchFamily="34" charset="0"/>
-              <a:buChar char="•"/>
-              <a:defRPr sz="1800" kern="1200">
-                <a:solidFill>
-                  <a:schemeClr val="tx1"/>
-                </a:solidFill>
-                <a:latin typeface="+mn-lt"/>
-                <a:ea typeface="+mn-ea"/>
-                <a:cs typeface="+mn-cs"/>
-              </a:defRPr>
-            </a:lvl4pPr>
-            <a:lvl5pPr marL="2057400" indent="-228600" algn="l" defTabSz="914400" rtl="0" eaLnBrk="1" latinLnBrk="0" hangingPunct="1">
-              <a:lnSpc>
-                <a:spcPct val="90000"/>
-              </a:lnSpc>
-              <a:spcBef>
-                <a:spcPts val="500"/>
-              </a:spcBef>
-              <a:buFont typeface="Arial" panose="020B0604020202020204" pitchFamily="34" charset="0"/>
-              <a:buChar char="•"/>
-              <a:defRPr sz="1800" kern="1200">
-                <a:solidFill>
-                  <a:schemeClr val="tx1"/>
-                </a:solidFill>
-                <a:latin typeface="+mn-lt"/>
-                <a:ea typeface="+mn-ea"/>
-                <a:cs typeface="+mn-cs"/>
-              </a:defRPr>
-            </a:lvl5pPr>
-            <a:lvl6pPr marL="2514600" indent="-228600" algn="l" defTabSz="914400" rtl="0" eaLnBrk="1" latinLnBrk="0" hangingPunct="1">
-              <a:lnSpc>
-                <a:spcPct val="90000"/>
-              </a:lnSpc>
-              <a:spcBef>
-                <a:spcPts val="500"/>
-              </a:spcBef>
-              <a:buFont typeface="Arial" panose="020B0604020202020204" pitchFamily="34" charset="0"/>
-              <a:buChar char="•"/>
-              <a:defRPr sz="1800" kern="1200">
-                <a:solidFill>
-                  <a:schemeClr val="tx1"/>
-                </a:solidFill>
-                <a:latin typeface="+mn-lt"/>
-                <a:ea typeface="+mn-ea"/>
-                <a:cs typeface="+mn-cs"/>
-              </a:defRPr>
-            </a:lvl6pPr>
-            <a:lvl7pPr marL="2971800" indent="-228600" algn="l" defTabSz="914400" rtl="0" eaLnBrk="1" latinLnBrk="0" hangingPunct="1">
-              <a:lnSpc>
-                <a:spcPct val="90000"/>
-              </a:lnSpc>
-              <a:spcBef>
-                <a:spcPts val="500"/>
-              </a:spcBef>
-              <a:buFont typeface="Arial" panose="020B0604020202020204" pitchFamily="34" charset="0"/>
-              <a:buChar char="•"/>
-              <a:defRPr sz="1800" kern="1200">
-                <a:solidFill>
-                  <a:schemeClr val="tx1"/>
-                </a:solidFill>
-                <a:latin typeface="+mn-lt"/>
-                <a:ea typeface="+mn-ea"/>
-                <a:cs typeface="+mn-cs"/>
-              </a:defRPr>
-            </a:lvl7pPr>
-            <a:lvl8pPr marL="3429000" indent="-228600" algn="l" defTabSz="914400" rtl="0" eaLnBrk="1" latinLnBrk="0" hangingPunct="1">
-              <a:lnSpc>
-                <a:spcPct val="90000"/>
-              </a:lnSpc>
-              <a:spcBef>
-                <a:spcPts val="500"/>
-              </a:spcBef>
-              <a:buFont typeface="Arial" panose="020B0604020202020204" pitchFamily="34" charset="0"/>
-              <a:buChar char="•"/>
-              <a:defRPr sz="1800" kern="1200">
-                <a:solidFill>
-                  <a:schemeClr val="tx1"/>
-                </a:solidFill>
-                <a:latin typeface="+mn-lt"/>
-                <a:ea typeface="+mn-ea"/>
-                <a:cs typeface="+mn-cs"/>
-              </a:defRPr>
-            </a:lvl8pPr>
-            <a:lvl9pPr marL="3886200" indent="-228600" algn="l" defTabSz="914400" rtl="0" eaLnBrk="1" latinLnBrk="0" hangingPunct="1">
-              <a:lnSpc>
-                <a:spcPct val="90000"/>
-              </a:lnSpc>
-              <a:spcBef>
-                <a:spcPts val="500"/>
-              </a:spcBef>
-              <a:buFont typeface="Arial" panose="020B0604020202020204" pitchFamily="34" charset="0"/>
-              <a:buChar char="•"/>
-              <a:defRPr sz="1800" kern="1200">
-                <a:solidFill>
-                  <a:schemeClr val="tx1"/>
-                </a:solidFill>
-                <a:latin typeface="+mn-lt"/>
-                <a:ea typeface="+mn-ea"/>
-                <a:cs typeface="+mn-cs"/>
-              </a:defRPr>
-            </a:lvl9pPr>
-          </a:lstStyle>
+          <a:lstStyle/>
           <a:p>
             <a:pPr marL="0" indent="0" algn="ctr">
-              <a:buFont typeface="Arial" panose="020B0604020202020204" pitchFamily="34" charset="0"/>
               <a:buNone/>
             </a:pPr>
             <a:r>
@@ -9383,7 +9312,6 @@
           </a:p>
           <a:p>
             <a:pPr marL="0" indent="0" algn="ctr">
-              <a:buFont typeface="Arial" panose="020B0604020202020204" pitchFamily="34" charset="0"/>
               <a:buNone/>
             </a:pPr>
             <a:r>
@@ -9391,21 +9319,77 @@
                 <a:latin typeface="Segoe UI" panose="020B0502040204020203" pitchFamily="34" charset="0"/>
                 <a:cs typeface="Segoe UI" panose="020B0502040204020203" pitchFamily="34" charset="0"/>
               </a:rPr>
-              <a:t>בלוק מספר 7 מתוך 8 הסתיים.</a:t>
-            </a:r>
-          </a:p>
-          <a:p>
-            <a:pPr marL="0" indent="0" algn="ctr">
-              <a:buFont typeface="Arial" panose="020B0604020202020204" pitchFamily="34" charset="0"/>
-              <a:buNone/>
-            </a:pPr>
+              <a:t>בלוק מספר </a:t>
+            </a:r>
+            <a:r>
+              <a:rPr lang="he-IL" sz="1800" dirty="0" smtClean="0">
+                <a:latin typeface="Segoe UI" panose="020B0502040204020203" pitchFamily="34" charset="0"/>
+                <a:cs typeface="Segoe UI" panose="020B0502040204020203" pitchFamily="34" charset="0"/>
+              </a:rPr>
+              <a:t>7 </a:t>
+            </a:r>
             <a:r>
               <a:rPr lang="he-IL" sz="1800" dirty="0">
                 <a:latin typeface="Segoe UI" panose="020B0502040204020203" pitchFamily="34" charset="0"/>
                 <a:cs typeface="Segoe UI" panose="020B0502040204020203" pitchFamily="34" charset="0"/>
               </a:rPr>
-              <a:t>אתה יכול התמתח קצת ולקחת הפסקה קצרה בזמן שאתה יושב בכיסא.</a:t>
-            </a:r>
+              <a:t>מתוך 8 הסתיים.</a:t>
+            </a:r>
+          </a:p>
+          <a:p>
+            <a:pPr marL="0" indent="0" algn="ctr">
+              <a:buNone/>
+            </a:pPr>
+            <a:r>
+              <a:rPr lang="he-IL" sz="1800" dirty="0">
+                <a:latin typeface="Segoe UI" panose="020B0502040204020203" pitchFamily="34" charset="0"/>
+                <a:cs typeface="Segoe UI" panose="020B0502040204020203" pitchFamily="34" charset="0"/>
+              </a:rPr>
+              <a:t>אתה יכול </a:t>
+            </a:r>
+            <a:r>
+              <a:rPr lang="he-IL" sz="1800" dirty="0" smtClean="0">
+                <a:latin typeface="Segoe UI" panose="020B0502040204020203" pitchFamily="34" charset="0"/>
+                <a:cs typeface="Segoe UI" panose="020B0502040204020203" pitchFamily="34" charset="0"/>
+              </a:rPr>
+              <a:t>להתמתח </a:t>
+            </a:r>
+            <a:r>
+              <a:rPr lang="he-IL" sz="1800" dirty="0">
+                <a:latin typeface="Segoe UI" panose="020B0502040204020203" pitchFamily="34" charset="0"/>
+                <a:cs typeface="Segoe UI" panose="020B0502040204020203" pitchFamily="34" charset="0"/>
+              </a:rPr>
+              <a:t>קצת ולקחת הפסקה קצרה בזמן שאתה יושב בכיסא</a:t>
+            </a:r>
+            <a:r>
+              <a:rPr lang="he-IL" sz="1800" dirty="0" smtClean="0">
+                <a:latin typeface="Segoe UI" panose="020B0502040204020203" pitchFamily="34" charset="0"/>
+                <a:cs typeface="Segoe UI" panose="020B0502040204020203" pitchFamily="34" charset="0"/>
+              </a:rPr>
+              <a:t>.</a:t>
+            </a:r>
+            <a:endParaRPr lang="en-US" sz="1800" dirty="0" smtClean="0">
+              <a:latin typeface="Segoe UI" panose="020B0502040204020203" pitchFamily="34" charset="0"/>
+              <a:cs typeface="Segoe UI" panose="020B0502040204020203" pitchFamily="34" charset="0"/>
+            </a:endParaRPr>
+          </a:p>
+          <a:p>
+            <a:pPr marL="0" indent="0" algn="ctr">
+              <a:buNone/>
+            </a:pPr>
+            <a:endParaRPr lang="en-US" sz="1800" dirty="0">
+              <a:latin typeface="Segoe UI" panose="020B0502040204020203" pitchFamily="34" charset="0"/>
+              <a:cs typeface="Segoe UI" panose="020B0502040204020203" pitchFamily="34" charset="0"/>
+            </a:endParaRPr>
+          </a:p>
+          <a:p>
+            <a:pPr marL="0" indent="0" algn="ctr">
+              <a:buNone/>
+            </a:pPr>
+            <a:endParaRPr lang="he-IL" sz="1800" dirty="0">
+              <a:latin typeface="Segoe UI" panose="020B0502040204020203" pitchFamily="34" charset="0"/>
+              <a:cs typeface="Segoe UI" panose="020B0502040204020203" pitchFamily="34" charset="0"/>
+            </a:endParaRPr>
           </a:p>
         </p:txBody>
       </p:sp>
@@ -9450,10 +9434,108 @@
           </a:p>
         </p:txBody>
       </p:sp>
+      <p:sp>
+        <p:nvSpPr>
+          <p:cNvPr id="2" name="TextBox 1"/>
+          <p:cNvSpPr txBox="1"/>
+          <p:nvPr/>
+        </p:nvSpPr>
+        <p:spPr>
+          <a:xfrm>
+            <a:off x="6668236" y="3218812"/>
+            <a:ext cx="860326" cy="369332"/>
+          </a:xfrm>
+          <a:prstGeom prst="rect">
+            <a:avLst/>
+          </a:prstGeom>
+          <a:noFill/>
+        </p:spPr>
+        <p:txBody>
+          <a:bodyPr wrap="square" rtlCol="0">
+            <a:spAutoFit/>
+          </a:bodyPr>
+          <a:lstStyle/>
+          <a:p>
+            <a:r>
+              <a:rPr lang="he-IL" dirty="0" smtClean="0"/>
+              <a:t>אספת</a:t>
+            </a:r>
+            <a:endParaRPr lang="en-US" dirty="0"/>
+          </a:p>
+        </p:txBody>
+      </p:sp>
+      <p:sp>
+        <p:nvSpPr>
+          <p:cNvPr id="5" name="TextBox 4"/>
+          <p:cNvSpPr txBox="1"/>
+          <p:nvPr/>
+        </p:nvSpPr>
+        <p:spPr>
+          <a:xfrm>
+            <a:off x="4551260" y="3218812"/>
+            <a:ext cx="1087540" cy="369332"/>
+          </a:xfrm>
+          <a:prstGeom prst="rect">
+            <a:avLst/>
+          </a:prstGeom>
+          <a:noFill/>
+        </p:spPr>
+        <p:txBody>
+          <a:bodyPr wrap="square" rtlCol="0">
+            <a:spAutoFit/>
+          </a:bodyPr>
+          <a:lstStyle/>
+          <a:p>
+            <a:r>
+              <a:rPr lang="he-IL" dirty="0" smtClean="0"/>
+              <a:t>מטבעות</a:t>
+            </a:r>
+            <a:endParaRPr lang="en-US" dirty="0"/>
+          </a:p>
+        </p:txBody>
+      </p:sp>
+      <p:sp>
+        <p:nvSpPr>
+          <p:cNvPr id="6" name="TextBox 5">
+            <a:extLst>
+              <a:ext uri="{FF2B5EF4-FFF2-40B4-BE49-F238E27FC236}">
+                <a16:creationId xmlns:a16="http://schemas.microsoft.com/office/drawing/2014/main" id="{60D9569B-6FF1-E6D8-3D9C-6523D58A9BA8}"/>
+              </a:ext>
+            </a:extLst>
+          </p:cNvPr>
+          <p:cNvSpPr txBox="1"/>
+          <p:nvPr/>
+        </p:nvSpPr>
+        <p:spPr>
+          <a:xfrm>
+            <a:off x="5638800" y="3244334"/>
+            <a:ext cx="914400" cy="369332"/>
+          </a:xfrm>
+          <a:prstGeom prst="rect">
+            <a:avLst/>
+          </a:prstGeom>
+          <a:noFill/>
+          <a:ln>
+            <a:solidFill>
+              <a:schemeClr val="tx1"/>
+            </a:solidFill>
+          </a:ln>
+        </p:spPr>
+        <p:txBody>
+          <a:bodyPr wrap="square" rtlCol="1">
+            <a:spAutoFit/>
+          </a:bodyPr>
+          <a:lstStyle/>
+          <a:p>
+            <a:pPr algn="ctr"/>
+            <a:endParaRPr lang="he-IL" dirty="0"/>
+          </a:p>
+        </p:txBody>
+      </p:sp>
     </p:spTree>
     <p:extLst>
       <p:ext uri="{BB962C8B-B14F-4D97-AF65-F5344CB8AC3E}">
-        <p14:creationId xmlns:p14="http://schemas.microsoft.com/office/powerpoint/2010/main" val="4042436076"/>
+        <p14:creationId xmlns:p14="http://schemas.microsoft.com/office/powerpoint/2010/main" val="3798584024"/>
       </p:ext>
     </p:extLst>
   </p:cSld>
@@ -9485,195 +9567,30 @@
           <p:cNvPr id="4" name="Content Placeholder 2">
             <a:extLst>
               <a:ext uri="{FF2B5EF4-FFF2-40B4-BE49-F238E27FC236}">
-                <a16:creationId xmlns:a16="http://schemas.microsoft.com/office/drawing/2014/main" id="{58CD87C3-1238-B96C-120A-96414809EEFF}"/>
-              </a:ext>
-            </a:extLst>
-          </p:cNvPr>
-          <p:cNvSpPr txBox="1">
-            <a:spLocks/>
+                <a16:creationId xmlns:a16="http://schemas.microsoft.com/office/drawing/2014/main" id="{F338F7C3-1DA3-FC02-A5C3-CA618AC932DC}"/>
+              </a:ext>
+            </a:extLst>
+          </p:cNvPr>
+          <p:cNvSpPr>
+            <a:spLocks noGrp="1"/>
           </p:cNvSpPr>
-          <p:nvPr/>
-        </p:nvSpPr>
-        <p:spPr>
-          <a:xfrm>
-            <a:off x="990600" y="1978025"/>
+          <p:nvPr>
+            <p:ph idx="1"/>
+          </p:nvPr>
+        </p:nvSpPr>
+        <p:spPr>
+          <a:xfrm>
+            <a:off x="838200" y="1825625"/>
             <a:ext cx="10515600" cy="4351338"/>
           </a:xfrm>
-          <a:prstGeom prst="rect">
-            <a:avLst/>
-          </a:prstGeom>
-        </p:spPr>
-        <p:txBody>
-          <a:bodyPr vert="horz" lIns="91440" tIns="45720" rIns="91440" bIns="45720" rtlCol="0">
+        </p:spPr>
+        <p:txBody>
+          <a:bodyPr>
             <a:normAutofit/>
           </a:bodyPr>
-          <a:lstStyle>
-            <a:lvl1pPr marL="228600" indent="-228600" algn="l" defTabSz="914400" rtl="0" eaLnBrk="1" latinLnBrk="0" hangingPunct="1">
-              <a:lnSpc>
-                <a:spcPct val="90000"/>
-              </a:lnSpc>
-              <a:spcBef>
-                <a:spcPts val="1000"/>
-              </a:spcBef>
-              <a:buFont typeface="Arial" panose="020B0604020202020204" pitchFamily="34" charset="0"/>
-              <a:buChar char="•"/>
-              <a:defRPr sz="2800" kern="1200">
-                <a:solidFill>
-                  <a:schemeClr val="tx1"/>
-                </a:solidFill>
-                <a:latin typeface="+mn-lt"/>
-                <a:ea typeface="+mn-ea"/>
-                <a:cs typeface="+mn-cs"/>
-              </a:defRPr>
-            </a:lvl1pPr>
-            <a:lvl2pPr marL="685800" indent="-228600" algn="l" defTabSz="914400" rtl="0" eaLnBrk="1" latinLnBrk="0" hangingPunct="1">
-              <a:lnSpc>
-                <a:spcPct val="90000"/>
-              </a:lnSpc>
-              <a:spcBef>
-                <a:spcPts val="500"/>
-              </a:spcBef>
-              <a:buFont typeface="Arial" panose="020B0604020202020204" pitchFamily="34" charset="0"/>
-              <a:buChar char="•"/>
-              <a:defRPr sz="2400" kern="1200">
-                <a:solidFill>
-                  <a:schemeClr val="tx1"/>
-                </a:solidFill>
-                <a:latin typeface="+mn-lt"/>
-                <a:ea typeface="+mn-ea"/>
-                <a:cs typeface="+mn-cs"/>
-              </a:defRPr>
-            </a:lvl2pPr>
-            <a:lvl3pPr marL="1143000" indent="-228600" algn="l" defTabSz="914400" rtl="0" eaLnBrk="1" latinLnBrk="0" hangingPunct="1">
-              <a:lnSpc>
-                <a:spcPct val="90000"/>
-              </a:lnSpc>
-              <a:spcBef>
-                <a:spcPts val="500"/>
-              </a:spcBef>
-              <a:buFont typeface="Arial" panose="020B0604020202020204" pitchFamily="34" charset="0"/>
-              <a:buChar char="•"/>
-              <a:defRPr sz="2000" kern="1200">
-                <a:solidFill>
-                  <a:schemeClr val="tx1"/>
-                </a:solidFill>
-                <a:latin typeface="+mn-lt"/>
-                <a:ea typeface="+mn-ea"/>
-                <a:cs typeface="+mn-cs"/>
-              </a:defRPr>
-            </a:lvl3pPr>
-            <a:lvl4pPr marL="1600200" indent="-228600" algn="l" defTabSz="914400" rtl="0" eaLnBrk="1" latinLnBrk="0" hangingPunct="1">
-              <a:lnSpc>
-                <a:spcPct val="90000"/>
-              </a:lnSpc>
-              <a:spcBef>
-                <a:spcPts val="500"/>
-              </a:spcBef>
-              <a:buFont typeface="Arial" panose="020B0604020202020204" pitchFamily="34" charset="0"/>
-              <a:buChar char="•"/>
-              <a:defRPr sz="1800" kern="1200">
-                <a:solidFill>
-                  <a:schemeClr val="tx1"/>
-                </a:solidFill>
-                <a:latin typeface="+mn-lt"/>
-                <a:ea typeface="+mn-ea"/>
-                <a:cs typeface="+mn-cs"/>
-              </a:defRPr>
-            </a:lvl4pPr>
-            <a:lvl5pPr marL="2057400" indent="-228600" algn="l" defTabSz="914400" rtl="0" eaLnBrk="1" latinLnBrk="0" hangingPunct="1">
-              <a:lnSpc>
-                <a:spcPct val="90000"/>
-              </a:lnSpc>
-              <a:spcBef>
-                <a:spcPts val="500"/>
-              </a:spcBef>
-              <a:buFont typeface="Arial" panose="020B0604020202020204" pitchFamily="34" charset="0"/>
-              <a:buChar char="•"/>
-              <a:defRPr sz="1800" kern="1200">
-                <a:solidFill>
-                  <a:schemeClr val="tx1"/>
-                </a:solidFill>
-                <a:latin typeface="+mn-lt"/>
-                <a:ea typeface="+mn-ea"/>
-                <a:cs typeface="+mn-cs"/>
-              </a:defRPr>
-            </a:lvl5pPr>
-            <a:lvl6pPr marL="2514600" indent="-228600" algn="l" defTabSz="914400" rtl="0" eaLnBrk="1" latinLnBrk="0" hangingPunct="1">
-              <a:lnSpc>
-                <a:spcPct val="90000"/>
-              </a:lnSpc>
-              <a:spcBef>
-                <a:spcPts val="500"/>
-              </a:spcBef>
-              <a:buFont typeface="Arial" panose="020B0604020202020204" pitchFamily="34" charset="0"/>
-              <a:buChar char="•"/>
-              <a:defRPr sz="1800" kern="1200">
-                <a:solidFill>
-                  <a:schemeClr val="tx1"/>
-                </a:solidFill>
-                <a:latin typeface="+mn-lt"/>
-                <a:ea typeface="+mn-ea"/>
-                <a:cs typeface="+mn-cs"/>
-              </a:defRPr>
-            </a:lvl6pPr>
-            <a:lvl7pPr marL="2971800" indent="-228600" algn="l" defTabSz="914400" rtl="0" eaLnBrk="1" latinLnBrk="0" hangingPunct="1">
-              <a:lnSpc>
-                <a:spcPct val="90000"/>
-              </a:lnSpc>
-              <a:spcBef>
-                <a:spcPts val="500"/>
-              </a:spcBef>
-              <a:buFont typeface="Arial" panose="020B0604020202020204" pitchFamily="34" charset="0"/>
-              <a:buChar char="•"/>
-              <a:defRPr sz="1800" kern="1200">
-                <a:solidFill>
-                  <a:schemeClr val="tx1"/>
-                </a:solidFill>
-                <a:latin typeface="+mn-lt"/>
-                <a:ea typeface="+mn-ea"/>
-                <a:cs typeface="+mn-cs"/>
-              </a:defRPr>
-            </a:lvl7pPr>
-            <a:lvl8pPr marL="3429000" indent="-228600" algn="l" defTabSz="914400" rtl="0" eaLnBrk="1" latinLnBrk="0" hangingPunct="1">
-              <a:lnSpc>
-                <a:spcPct val="90000"/>
-              </a:lnSpc>
-              <a:spcBef>
-                <a:spcPts val="500"/>
-              </a:spcBef>
-              <a:buFont typeface="Arial" panose="020B0604020202020204" pitchFamily="34" charset="0"/>
-              <a:buChar char="•"/>
-              <a:defRPr sz="1800" kern="1200">
-                <a:solidFill>
-                  <a:schemeClr val="tx1"/>
-                </a:solidFill>
-                <a:latin typeface="+mn-lt"/>
-                <a:ea typeface="+mn-ea"/>
-                <a:cs typeface="+mn-cs"/>
-              </a:defRPr>
-            </a:lvl8pPr>
-            <a:lvl9pPr marL="3886200" indent="-228600" algn="l" defTabSz="914400" rtl="0" eaLnBrk="1" latinLnBrk="0" hangingPunct="1">
-              <a:lnSpc>
-                <a:spcPct val="90000"/>
-              </a:lnSpc>
-              <a:spcBef>
-                <a:spcPts val="500"/>
-              </a:spcBef>
-              <a:buFont typeface="Arial" panose="020B0604020202020204" pitchFamily="34" charset="0"/>
-              <a:buChar char="•"/>
-              <a:defRPr sz="1800" kern="1200">
-                <a:solidFill>
-                  <a:schemeClr val="tx1"/>
-                </a:solidFill>
-                <a:latin typeface="+mn-lt"/>
-                <a:ea typeface="+mn-ea"/>
-                <a:cs typeface="+mn-cs"/>
-              </a:defRPr>
-            </a:lvl9pPr>
-          </a:lstStyle>
+          <a:lstStyle/>
           <a:p>
             <a:pPr marL="0" indent="0" algn="ctr">
-              <a:buFont typeface="Arial" panose="020B0604020202020204" pitchFamily="34" charset="0"/>
               <a:buNone/>
             </a:pPr>
             <a:r>
@@ -9686,7 +9603,6 @@
           </a:p>
           <a:p>
             <a:pPr marL="0" indent="0" algn="ctr">
-              <a:buFont typeface="Arial" panose="020B0604020202020204" pitchFamily="34" charset="0"/>
               <a:buNone/>
             </a:pPr>
             <a:r>
@@ -9694,21 +9610,77 @@
                 <a:latin typeface="Segoe UI" panose="020B0502040204020203" pitchFamily="34" charset="0"/>
                 <a:cs typeface="Segoe UI" panose="020B0502040204020203" pitchFamily="34" charset="0"/>
               </a:rPr>
-              <a:t>בלוק מספר 8 מתוך 8 הסתיים.</a:t>
-            </a:r>
-          </a:p>
-          <a:p>
-            <a:pPr marL="0" indent="0" algn="ctr">
-              <a:buFont typeface="Arial" panose="020B0604020202020204" pitchFamily="34" charset="0"/>
-              <a:buNone/>
-            </a:pPr>
+              <a:t>בלוק מספר </a:t>
+            </a:r>
+            <a:r>
+              <a:rPr lang="he-IL" sz="1800" dirty="0" smtClean="0">
+                <a:latin typeface="Segoe UI" panose="020B0502040204020203" pitchFamily="34" charset="0"/>
+                <a:cs typeface="Segoe UI" panose="020B0502040204020203" pitchFamily="34" charset="0"/>
+              </a:rPr>
+              <a:t>8 </a:t>
+            </a:r>
             <a:r>
               <a:rPr lang="he-IL" sz="1800" dirty="0">
                 <a:latin typeface="Segoe UI" panose="020B0502040204020203" pitchFamily="34" charset="0"/>
                 <a:cs typeface="Segoe UI" panose="020B0502040204020203" pitchFamily="34" charset="0"/>
               </a:rPr>
-              <a:t>אתה יכול התמתח קצת ולקחת הפסקה קצרה בזמן שאתה יושב בכיסא.</a:t>
-            </a:r>
+              <a:t>מתוך 8 הסתיים.</a:t>
+            </a:r>
+          </a:p>
+          <a:p>
+            <a:pPr marL="0" indent="0" algn="ctr">
+              <a:buNone/>
+            </a:pPr>
+            <a:r>
+              <a:rPr lang="he-IL" sz="1800" dirty="0">
+                <a:latin typeface="Segoe UI" panose="020B0502040204020203" pitchFamily="34" charset="0"/>
+                <a:cs typeface="Segoe UI" panose="020B0502040204020203" pitchFamily="34" charset="0"/>
+              </a:rPr>
+              <a:t>אתה יכול </a:t>
+            </a:r>
+            <a:r>
+              <a:rPr lang="he-IL" sz="1800" dirty="0" smtClean="0">
+                <a:latin typeface="Segoe UI" panose="020B0502040204020203" pitchFamily="34" charset="0"/>
+                <a:cs typeface="Segoe UI" panose="020B0502040204020203" pitchFamily="34" charset="0"/>
+              </a:rPr>
+              <a:t>להתמתח </a:t>
+            </a:r>
+            <a:r>
+              <a:rPr lang="he-IL" sz="1800" dirty="0">
+                <a:latin typeface="Segoe UI" panose="020B0502040204020203" pitchFamily="34" charset="0"/>
+                <a:cs typeface="Segoe UI" panose="020B0502040204020203" pitchFamily="34" charset="0"/>
+              </a:rPr>
+              <a:t>קצת ולקחת הפסקה קצרה בזמן שאתה יושב בכיסא</a:t>
+            </a:r>
+            <a:r>
+              <a:rPr lang="he-IL" sz="1800" dirty="0" smtClean="0">
+                <a:latin typeface="Segoe UI" panose="020B0502040204020203" pitchFamily="34" charset="0"/>
+                <a:cs typeface="Segoe UI" panose="020B0502040204020203" pitchFamily="34" charset="0"/>
+              </a:rPr>
+              <a:t>.</a:t>
+            </a:r>
+            <a:endParaRPr lang="en-US" sz="1800" dirty="0" smtClean="0">
+              <a:latin typeface="Segoe UI" panose="020B0502040204020203" pitchFamily="34" charset="0"/>
+              <a:cs typeface="Segoe UI" panose="020B0502040204020203" pitchFamily="34" charset="0"/>
+            </a:endParaRPr>
+          </a:p>
+          <a:p>
+            <a:pPr marL="0" indent="0" algn="ctr">
+              <a:buNone/>
+            </a:pPr>
+            <a:endParaRPr lang="en-US" sz="1800" dirty="0">
+              <a:latin typeface="Segoe UI" panose="020B0502040204020203" pitchFamily="34" charset="0"/>
+              <a:cs typeface="Segoe UI" panose="020B0502040204020203" pitchFamily="34" charset="0"/>
+            </a:endParaRPr>
+          </a:p>
+          <a:p>
+            <a:pPr marL="0" indent="0" algn="ctr">
+              <a:buNone/>
+            </a:pPr>
+            <a:endParaRPr lang="he-IL" sz="1800" dirty="0">
+              <a:latin typeface="Segoe UI" panose="020B0502040204020203" pitchFamily="34" charset="0"/>
+              <a:cs typeface="Segoe UI" panose="020B0502040204020203" pitchFamily="34" charset="0"/>
+            </a:endParaRPr>
           </a:p>
         </p:txBody>
       </p:sp>
@@ -9753,10 +9725,108 @@
           </a:p>
         </p:txBody>
       </p:sp>
+      <p:sp>
+        <p:nvSpPr>
+          <p:cNvPr id="2" name="TextBox 1"/>
+          <p:cNvSpPr txBox="1"/>
+          <p:nvPr/>
+        </p:nvSpPr>
+        <p:spPr>
+          <a:xfrm>
+            <a:off x="6668236" y="3218812"/>
+            <a:ext cx="860326" cy="369332"/>
+          </a:xfrm>
+          <a:prstGeom prst="rect">
+            <a:avLst/>
+          </a:prstGeom>
+          <a:noFill/>
+        </p:spPr>
+        <p:txBody>
+          <a:bodyPr wrap="square" rtlCol="0">
+            <a:spAutoFit/>
+          </a:bodyPr>
+          <a:lstStyle/>
+          <a:p>
+            <a:r>
+              <a:rPr lang="he-IL" dirty="0" smtClean="0"/>
+              <a:t>אספת</a:t>
+            </a:r>
+            <a:endParaRPr lang="en-US" dirty="0"/>
+          </a:p>
+        </p:txBody>
+      </p:sp>
+      <p:sp>
+        <p:nvSpPr>
+          <p:cNvPr id="5" name="TextBox 4"/>
+          <p:cNvSpPr txBox="1"/>
+          <p:nvPr/>
+        </p:nvSpPr>
+        <p:spPr>
+          <a:xfrm>
+            <a:off x="4551260" y="3218812"/>
+            <a:ext cx="1087540" cy="369332"/>
+          </a:xfrm>
+          <a:prstGeom prst="rect">
+            <a:avLst/>
+          </a:prstGeom>
+          <a:noFill/>
+        </p:spPr>
+        <p:txBody>
+          <a:bodyPr wrap="square" rtlCol="0">
+            <a:spAutoFit/>
+          </a:bodyPr>
+          <a:lstStyle/>
+          <a:p>
+            <a:r>
+              <a:rPr lang="he-IL" dirty="0" smtClean="0"/>
+              <a:t>מטבעות</a:t>
+            </a:r>
+            <a:endParaRPr lang="en-US" dirty="0"/>
+          </a:p>
+        </p:txBody>
+      </p:sp>
+      <p:sp>
+        <p:nvSpPr>
+          <p:cNvPr id="6" name="TextBox 5">
+            <a:extLst>
+              <a:ext uri="{FF2B5EF4-FFF2-40B4-BE49-F238E27FC236}">
+                <a16:creationId xmlns:a16="http://schemas.microsoft.com/office/drawing/2014/main" id="{60D9569B-6FF1-E6D8-3D9C-6523D58A9BA8}"/>
+              </a:ext>
+            </a:extLst>
+          </p:cNvPr>
+          <p:cNvSpPr txBox="1"/>
+          <p:nvPr/>
+        </p:nvSpPr>
+        <p:spPr>
+          <a:xfrm>
+            <a:off x="5638800" y="3244334"/>
+            <a:ext cx="914400" cy="369332"/>
+          </a:xfrm>
+          <a:prstGeom prst="rect">
+            <a:avLst/>
+          </a:prstGeom>
+          <a:noFill/>
+          <a:ln>
+            <a:solidFill>
+              <a:schemeClr val="tx1"/>
+            </a:solidFill>
+          </a:ln>
+        </p:spPr>
+        <p:txBody>
+          <a:bodyPr wrap="square" rtlCol="1">
+            <a:spAutoFit/>
+          </a:bodyPr>
+          <a:lstStyle/>
+          <a:p>
+            <a:pPr algn="ctr"/>
+            <a:endParaRPr lang="he-IL" dirty="0"/>
+          </a:p>
+        </p:txBody>
+      </p:sp>
     </p:spTree>
     <p:extLst>
       <p:ext uri="{BB962C8B-B14F-4D97-AF65-F5344CB8AC3E}">
-        <p14:creationId xmlns:p14="http://schemas.microsoft.com/office/powerpoint/2010/main" val="1367733835"/>
+        <p14:creationId xmlns:p14="http://schemas.microsoft.com/office/powerpoint/2010/main" val="3084366801"/>
       </p:ext>
     </p:extLst>
   </p:cSld>
@@ -11043,7 +11113,15 @@
             </a:pPr>
             <a:r>
               <a:rPr lang="he-IL" sz="1800" dirty="0"/>
-              <a:t>לאחר שבחרת פרח, אתה תראה את הבחירה שלך מסומנת על המסך.</a:t>
+              <a:t>לאחר שבחרת פרח, </a:t>
+            </a:r>
+            <a:r>
+              <a:rPr lang="he-IL" sz="1800" dirty="0" smtClean="0"/>
+              <a:t>רק הפרח שנבחר יישאר להופיע על </a:t>
+            </a:r>
+            <a:r>
+              <a:rPr lang="he-IL" sz="1800" dirty="0"/>
+              <a:t>המסך.</a:t>
             </a:r>
           </a:p>
           <a:p>
@@ -11052,8 +11130,21 @@
             </a:pPr>
             <a:r>
               <a:rPr lang="he-IL" sz="1800" dirty="0"/>
-              <a:t>כמו שניתן לראות בדוגמה, תתבצע בחירה עבור הפרח שמאלי (לחצן שמאלי בשלט).</a:t>
-            </a:r>
+              <a:t>כמו שניתן לראות בדוגמה, תתבצע בחירה עבור הפרח </a:t>
+            </a:r>
+            <a:r>
+              <a:rPr lang="he-IL" sz="1800" dirty="0" smtClean="0"/>
+              <a:t>השמאלי </a:t>
+            </a:r>
+            <a:r>
+              <a:rPr lang="he-IL" sz="1800" dirty="0"/>
+              <a:t>(לחצן שמאלי בשלט</a:t>
+            </a:r>
+            <a:r>
+              <a:rPr lang="he-IL" sz="1800" dirty="0" smtClean="0"/>
+              <a:t>) ורק הוא יופיע.</a:t>
+            </a:r>
+            <a:endParaRPr lang="he-IL" sz="1800" dirty="0"/>
           </a:p>
         </p:txBody>
       </p:sp>
@@ -11183,7 +11274,7 @@
 </file>
 
 <file path=ppt/slides/slide9.xml><?xml version="1.0" encoding="utf-8"?>
-<p:sld xmlns:a="http://schemas.openxmlformats.org/drawingml/2006/main" xmlns:r="http://schemas.openxmlformats.org/officeDocument/2006/relationships" xmlns:p="http://schemas.openxmlformats.org/presentationml/2006/main">
+<p:sld xmlns:a="http://schemas.openxmlformats.org/drawingml/2006/main" xmlns:r="http://schemas.openxmlformats.org/officeDocument/2006/relationships" xmlns:p="http://schemas.openxmlformats.org/presentationml/2006/main" show="0">
   <p:cSld>
     <p:spTree>
       <p:nvGrpSpPr>
@@ -11385,6 +11476,14 @@
   <p:clrMapOvr>
     <a:masterClrMapping/>
   </p:clrMapOvr>
+  <mc:AlternateContent xmlns:mc="http://schemas.openxmlformats.org/markup-compatibility/2006">
+    <mc:Choice xmlns:p14="http://schemas.microsoft.com/office/powerpoint/2010/main" Requires="p14">
+      <p:transition spd="slow" p14:dur="2000"/>
+    </mc:Choice>
+    <mc:Fallback>
+      <p:transition spd="slow"/>
+    </mc:Fallback>
+  </mc:AlternateContent>
 </p:sld>
 </file>
 

</xml_diff>